<commit_message>
Update event queue architecture diagram
</commit_message>
<xml_diff>
--- a/ApplicationDeveloperGuide/images/event-queue-architecture.pptx
+++ b/ApplicationDeveloperGuide/images/event-queue-architecture.pptx
@@ -218,7 +218,7 @@
               <a:rPr lang="fr-FR" smtClean="0">
                 <a:latin typeface="Calibri Regular" charset="0"/>
               </a:rPr>
-              <a:t>jeudi 3 août 2023</a:t>
+              <a:t>lundi 28 août 2023</a:t>
             </a:fld>
             <a:endParaRPr lang="en-US" dirty="0">
               <a:latin typeface="Calibri Regular" charset="0"/>
@@ -396,7 +396,7 @@
           <a:p>
             <a:fld id="{885721CF-495B-2B41-A23A-4D3221F80235}" type="datetime2">
               <a:rPr lang="fr-FR" smtClean="0"/>
-              <a:t>jeudi 3 août 2023</a:t>
+              <a:t>lundi 28 août 2023</a:t>
             </a:fld>
             <a:endParaRPr lang="en-US" dirty="0"/>
           </a:p>
@@ -16018,10 +16018,10 @@
       </p:grpSpPr>
       <p:grpSp>
         <p:nvGrpSpPr>
-          <p:cNvPr id="29" name="Group 28">
+          <p:cNvPr id="41" name="Group 40">
             <a:extLst>
               <a:ext uri="{FF2B5EF4-FFF2-40B4-BE49-F238E27FC236}">
-                <a16:creationId xmlns:a16="http://schemas.microsoft.com/office/drawing/2014/main" id="{A013B45D-FC2C-6C29-B747-2224771F0455}"/>
+                <a16:creationId xmlns:a16="http://schemas.microsoft.com/office/drawing/2014/main" id="{D213C0AE-CAAC-2C4F-0390-4E6155818A8A}"/>
               </a:ext>
             </a:extLst>
           </p:cNvPr>
@@ -16030,79 +16030,18 @@
         </p:nvGrpSpPr>
         <p:grpSpPr>
           <a:xfrm>
-            <a:off x="394340" y="1407815"/>
-            <a:ext cx="10746659" cy="4781291"/>
-            <a:chOff x="320381" y="1777609"/>
-            <a:chExt cx="10746659" cy="4781291"/>
+            <a:off x="411272" y="925212"/>
+            <a:ext cx="10451462" cy="5263922"/>
+            <a:chOff x="394340" y="434144"/>
+            <a:chExt cx="10746659" cy="5490735"/>
           </a:xfrm>
         </p:grpSpPr>
-        <p:sp>
-          <p:nvSpPr>
-            <p:cNvPr id="13" name="Rectangle: Rounded Corners 12">
+        <p:grpSp>
+          <p:nvGrpSpPr>
+            <p:cNvPr id="29" name="Group 28">
               <a:extLst>
                 <a:ext uri="{FF2B5EF4-FFF2-40B4-BE49-F238E27FC236}">
-                  <a16:creationId xmlns:a16="http://schemas.microsoft.com/office/drawing/2014/main" id="{956CDE49-FAC0-4306-5AB2-E73A0449A2B7}"/>
-                </a:ext>
-              </a:extLst>
-            </p:cNvPr>
-            <p:cNvSpPr/>
-            <p:nvPr/>
-          </p:nvSpPr>
-          <p:spPr>
-            <a:xfrm>
-              <a:off x="320381" y="2144806"/>
-              <a:ext cx="7085066" cy="4414094"/>
-            </a:xfrm>
-            <a:prstGeom prst="roundRect">
-              <a:avLst/>
-            </a:prstGeom>
-            <a:noFill/>
-            <a:ln w="57150">
-              <a:solidFill>
-                <a:schemeClr val="tx2"/>
-              </a:solidFill>
-            </a:ln>
-          </p:spPr>
-          <p:style>
-            <a:lnRef idx="0">
-              <a:scrgbClr r="0" g="0" b="0"/>
-            </a:lnRef>
-            <a:fillRef idx="0">
-              <a:scrgbClr r="0" g="0" b="0"/>
-            </a:fillRef>
-            <a:effectRef idx="0">
-              <a:scrgbClr r="0" g="0" b="0"/>
-            </a:effectRef>
-            <a:fontRef idx="minor">
-              <a:schemeClr val="lt1"/>
-            </a:fontRef>
-          </p:style>
-          <p:txBody>
-            <a:bodyPr rtlCol="0" anchor="t"/>
-            <a:lstStyle/>
-            <a:p>
-              <a:r>
-                <a:rPr lang="fr-FR" sz="1600" dirty="0">
-                  <a:solidFill>
-                    <a:schemeClr val="tx2"/>
-                  </a:solidFill>
-                </a:rPr>
-                <a:t>MEJ32 Thread</a:t>
-              </a:r>
-              <a:endParaRPr lang="en-GB" sz="1600" dirty="0">
-                <a:solidFill>
-                  <a:schemeClr val="tx2"/>
-                </a:solidFill>
-              </a:endParaRPr>
-            </a:p>
-          </p:txBody>
-        </p:sp>
-        <p:grpSp>
-          <p:nvGrpSpPr>
-            <p:cNvPr id="4" name="Group 3">
-              <a:extLst>
-                <a:ext uri="{FF2B5EF4-FFF2-40B4-BE49-F238E27FC236}">
-                  <a16:creationId xmlns:a16="http://schemas.microsoft.com/office/drawing/2014/main" id="{D4B360A5-526E-8727-9BD5-47FEE957F7A1}"/>
+                  <a16:creationId xmlns:a16="http://schemas.microsoft.com/office/drawing/2014/main" id="{A013B45D-FC2C-6C29-B747-2224771F0455}"/>
                 </a:ext>
               </a:extLst>
             </p:cNvPr>
@@ -16111,57 +16050,79 @@
           </p:nvGrpSpPr>
           <p:grpSpPr>
             <a:xfrm>
-              <a:off x="799444" y="1777609"/>
-              <a:ext cx="9627439" cy="4781291"/>
-              <a:chOff x="681998" y="1744053"/>
-              <a:chExt cx="9627439" cy="4781291"/>
+              <a:off x="394340" y="434144"/>
+              <a:ext cx="10746659" cy="4781291"/>
+              <a:chOff x="320381" y="1777609"/>
+              <a:chExt cx="10746659" cy="4781291"/>
             </a:xfrm>
           </p:grpSpPr>
-          <p:cxnSp>
-            <p:nvCxnSpPr>
-              <p:cNvPr id="34" name="Straight Connector 33">
+          <p:sp>
+            <p:nvSpPr>
+              <p:cNvPr id="13" name="Rectangle: Rounded Corners 12">
                 <a:extLst>
                   <a:ext uri="{FF2B5EF4-FFF2-40B4-BE49-F238E27FC236}">
-                    <a16:creationId xmlns:a16="http://schemas.microsoft.com/office/drawing/2014/main" id="{315654B8-27DF-F997-2CCF-8E30D817D325}"/>
+                    <a16:creationId xmlns:a16="http://schemas.microsoft.com/office/drawing/2014/main" id="{956CDE49-FAC0-4306-5AB2-E73A0449A2B7}"/>
                   </a:ext>
                 </a:extLst>
               </p:cNvPr>
-              <p:cNvCxnSpPr/>
+              <p:cNvSpPr/>
               <p:nvPr/>
-            </p:nvCxnSpPr>
+            </p:nvSpPr>
             <p:spPr>
               <a:xfrm>
-                <a:off x="7420406" y="1772816"/>
-                <a:ext cx="43746" cy="4752528"/>
+                <a:off x="320381" y="2144806"/>
+                <a:ext cx="7085066" cy="4414094"/>
               </a:xfrm>
-              <a:prstGeom prst="line">
+              <a:prstGeom prst="roundRect">
                 <a:avLst/>
               </a:prstGeom>
-              <a:ln>
-                <a:prstDash val="dash"/>
+              <a:noFill/>
+              <a:ln w="57150">
+                <a:solidFill>
+                  <a:schemeClr val="tx2"/>
+                </a:solidFill>
               </a:ln>
             </p:spPr>
             <p:style>
-              <a:lnRef idx="1">
-                <a:schemeClr val="accent1"/>
+              <a:lnRef idx="0">
+                <a:scrgbClr r="0" g="0" b="0"/>
               </a:lnRef>
               <a:fillRef idx="0">
-                <a:schemeClr val="accent1"/>
+                <a:scrgbClr r="0" g="0" b="0"/>
               </a:fillRef>
               <a:effectRef idx="0">
-                <a:schemeClr val="accent1"/>
+                <a:scrgbClr r="0" g="0" b="0"/>
               </a:effectRef>
               <a:fontRef idx="minor">
-                <a:schemeClr val="tx1"/>
+                <a:schemeClr val="lt1"/>
               </a:fontRef>
             </p:style>
-          </p:cxnSp>
+            <p:txBody>
+              <a:bodyPr rtlCol="0" anchor="t"/>
+              <a:lstStyle/>
+              <a:p>
+                <a:r>
+                  <a:rPr lang="fr-FR" sz="1600" dirty="0">
+                    <a:solidFill>
+                      <a:schemeClr val="tx2"/>
+                    </a:solidFill>
+                  </a:rPr>
+                  <a:t>MEJ32 Thread</a:t>
+                </a:r>
+                <a:endParaRPr lang="en-GB" sz="1600" dirty="0">
+                  <a:solidFill>
+                    <a:schemeClr val="tx2"/>
+                  </a:solidFill>
+                </a:endParaRPr>
+              </a:p>
+            </p:txBody>
+          </p:sp>
           <p:grpSp>
             <p:nvGrpSpPr>
-              <p:cNvPr id="3" name="Group 2">
+              <p:cNvPr id="4" name="Group 3">
                 <a:extLst>
                   <a:ext uri="{FF2B5EF4-FFF2-40B4-BE49-F238E27FC236}">
-                    <a16:creationId xmlns:a16="http://schemas.microsoft.com/office/drawing/2014/main" id="{5ACB64DA-0D77-46E8-5553-D56209D6A336}"/>
+                    <a16:creationId xmlns:a16="http://schemas.microsoft.com/office/drawing/2014/main" id="{D4B360A5-526E-8727-9BD5-47FEE957F7A1}"/>
                   </a:ext>
                 </a:extLst>
               </p:cNvPr>
@@ -16170,205 +16131,34 @@
             </p:nvGrpSpPr>
             <p:grpSpPr>
               <a:xfrm>
-                <a:off x="681998" y="1744053"/>
-                <a:ext cx="9627439" cy="4198764"/>
+                <a:off x="799444" y="1777609"/>
+                <a:ext cx="9627439" cy="4781291"/>
                 <a:chOff x="681998" y="1744053"/>
-                <a:chExt cx="9627439" cy="4198764"/>
+                <a:chExt cx="9627439" cy="4781291"/>
               </a:xfrm>
             </p:grpSpPr>
-            <p:sp>
-              <p:nvSpPr>
-                <p:cNvPr id="5" name="Rectangle: Rounded Corners 4">
+            <p:cxnSp>
+              <p:nvCxnSpPr>
+                <p:cNvPr id="34" name="Straight Connector 33">
                   <a:extLst>
                     <a:ext uri="{FF2B5EF4-FFF2-40B4-BE49-F238E27FC236}">
-                      <a16:creationId xmlns:a16="http://schemas.microsoft.com/office/drawing/2014/main" id="{93C61654-17B8-7333-F353-E006D65ABD65}"/>
+                      <a16:creationId xmlns:a16="http://schemas.microsoft.com/office/drawing/2014/main" id="{315654B8-27DF-F997-2CCF-8E30D817D325}"/>
                     </a:ext>
                   </a:extLst>
                 </p:cNvPr>
-                <p:cNvSpPr/>
-                <p:nvPr/>
-              </p:nvSpPr>
-              <p:spPr>
-                <a:xfrm>
-                  <a:off x="3120990" y="2650765"/>
-                  <a:ext cx="3465197" cy="3292052"/>
-                </a:xfrm>
-                <a:prstGeom prst="roundRect">
-                  <a:avLst/>
-                </a:prstGeom>
-                <a:solidFill>
-                  <a:schemeClr val="accent4"/>
-                </a:solidFill>
-                <a:ln>
-                  <a:noFill/>
-                </a:ln>
-              </p:spPr>
-              <p:style>
-                <a:lnRef idx="2">
-                  <a:schemeClr val="accent1">
-                    <a:shade val="50000"/>
-                  </a:schemeClr>
-                </a:lnRef>
-                <a:fillRef idx="1">
-                  <a:schemeClr val="accent1"/>
-                </a:fillRef>
-                <a:effectRef idx="0">
-                  <a:schemeClr val="accent1"/>
-                </a:effectRef>
-                <a:fontRef idx="minor">
-                  <a:schemeClr val="lt1"/>
-                </a:fontRef>
-              </p:style>
-              <p:txBody>
-                <a:bodyPr rtlCol="0" anchor="t"/>
-                <a:lstStyle/>
-                <a:p>
-                  <a:pPr algn="ctr"/>
-                  <a:r>
-                    <a:rPr lang="fr-FR" sz="1600" dirty="0"/>
-                    <a:t>EVENT QUEUE Thread</a:t>
-                  </a:r>
-                  <a:endParaRPr lang="en-GB" sz="1600" dirty="0"/>
-                </a:p>
-              </p:txBody>
-            </p:sp>
-            <p:grpSp>
-              <p:nvGrpSpPr>
-                <p:cNvPr id="14" name="Groupe 13">
-                  <a:extLst>
-                    <a:ext uri="{FF2B5EF4-FFF2-40B4-BE49-F238E27FC236}">
-                      <a16:creationId xmlns:a16="http://schemas.microsoft.com/office/drawing/2014/main" id="{BBC612B3-B30A-48BC-8354-46282A33B057}"/>
-                    </a:ext>
-                  </a:extLst>
-                </p:cNvPr>
-                <p:cNvGrpSpPr/>
-                <p:nvPr/>
-              </p:nvGrpSpPr>
-              <p:grpSpPr>
-                <a:xfrm>
-                  <a:off x="5686248" y="4433914"/>
-                  <a:ext cx="676275" cy="796222"/>
-                  <a:chOff x="4373659" y="2977598"/>
-                  <a:chExt cx="676275" cy="796222"/>
-                </a:xfrm>
-              </p:grpSpPr>
-              <p:pic>
-                <p:nvPicPr>
-                  <p:cNvPr id="15" name="Graphique 14" descr="Cercles avec flèches">
-                    <a:extLst>
-                      <a:ext uri="{FF2B5EF4-FFF2-40B4-BE49-F238E27FC236}">
-                        <a16:creationId xmlns:a16="http://schemas.microsoft.com/office/drawing/2014/main" id="{943E5DD7-36E8-4A2A-BD53-89019BD902D9}"/>
-                      </a:ext>
-                    </a:extLst>
-                  </p:cNvPr>
-                  <p:cNvPicPr>
-                    <a:picLocks noChangeAspect="1"/>
-                  </p:cNvPicPr>
-                  <p:nvPr/>
-                </p:nvPicPr>
-                <p:blipFill>
-                  <a:blip r:embed="rId3" cstate="print">
-                    <a:extLst>
-                      <a:ext uri="{28A0092B-C50C-407E-A947-70E740481C1C}">
-                        <a14:useLocalDpi xmlns:a14="http://schemas.microsoft.com/office/drawing/2010/main" val="0"/>
-                      </a:ext>
-                      <a:ext uri="{96DAC541-7B7A-43D3-8B79-37D633B846F1}">
-                        <asvg:svgBlip xmlns:asvg="http://schemas.microsoft.com/office/drawing/2016/SVG/main" r:embed="rId4"/>
-                      </a:ext>
-                    </a:extLst>
-                  </a:blip>
-                  <a:stretch>
-                    <a:fillRect/>
-                  </a:stretch>
-                </p:blipFill>
-                <p:spPr>
-                  <a:xfrm>
-                    <a:off x="4422373" y="3194971"/>
-                    <a:ext cx="578849" cy="578849"/>
-                  </a:xfrm>
-                  <a:prstGeom prst="rect">
-                    <a:avLst/>
-                  </a:prstGeom>
-                </p:spPr>
-              </p:pic>
-              <p:sp>
-                <p:nvSpPr>
-                  <p:cNvPr id="16" name="ZoneTexte 15">
-                    <a:extLst>
-                      <a:ext uri="{FF2B5EF4-FFF2-40B4-BE49-F238E27FC236}">
-                        <a16:creationId xmlns:a16="http://schemas.microsoft.com/office/drawing/2014/main" id="{D73A429E-E1B0-4518-A96B-9969D3F2DDD2}"/>
-                      </a:ext>
-                    </a:extLst>
-                  </p:cNvPr>
-                  <p:cNvSpPr txBox="1"/>
-                  <p:nvPr/>
-                </p:nvSpPr>
-                <p:spPr>
-                  <a:xfrm>
-                    <a:off x="4373659" y="2977598"/>
-                    <a:ext cx="676275" cy="215444"/>
-                  </a:xfrm>
-                  <a:prstGeom prst="rect">
-                    <a:avLst/>
-                  </a:prstGeom>
-                  <a:noFill/>
-                </p:spPr>
-                <p:txBody>
-                  <a:bodyPr vert="horz" wrap="square" lIns="0" tIns="0" rIns="0" bIns="0" numCol="1" spcCol="288000" rtlCol="0" anchor="t" anchorCtr="0">
-                    <a:spAutoFit/>
-                  </a:bodyPr>
-                  <a:lstStyle/>
-                  <a:p>
-                    <a:pPr algn="ctr">
-                      <a:spcBef>
-                        <a:spcPts val="0"/>
-                      </a:spcBef>
-                      <a:spcAft>
-                        <a:spcPts val="600"/>
-                      </a:spcAft>
-                    </a:pPr>
-                    <a:r>
-                      <a:rPr lang="en-US" sz="1400" b="1" i="0" spc="0" dirty="0">
-                        <a:ln>
-                          <a:noFill/>
-                        </a:ln>
-                        <a:solidFill>
-                          <a:schemeClr val="tx2"/>
-                        </a:solidFill>
-                        <a:latin typeface="Source Sans Pro Light" charset="0"/>
-                        <a:ea typeface="Source Sans Pro Light" charset="0"/>
-                        <a:cs typeface="Source Sans Pro Light" charset="0"/>
-                      </a:rPr>
-                      <a:t>PUMP</a:t>
-                    </a:r>
-                  </a:p>
-                </p:txBody>
-              </p:sp>
-            </p:grpSp>
-            <p:cxnSp>
-              <p:nvCxnSpPr>
-                <p:cNvPr id="17" name="Connecteur droit avec flèche 16">
-                  <a:extLst>
-                    <a:ext uri="{FF2B5EF4-FFF2-40B4-BE49-F238E27FC236}">
-                      <a16:creationId xmlns:a16="http://schemas.microsoft.com/office/drawing/2014/main" id="{D9773D76-B1C7-4F30-9C01-4A4AFB6EC7E6}"/>
-                    </a:ext>
-                  </a:extLst>
-                </p:cNvPr>
-                <p:cNvCxnSpPr>
-                  <a:cxnSpLocks/>
-                </p:cNvCxnSpPr>
+                <p:cNvCxnSpPr/>
                 <p:nvPr/>
               </p:nvCxnSpPr>
               <p:spPr>
-                <a:xfrm flipH="1">
-                  <a:off x="6313811" y="4941513"/>
-                  <a:ext cx="400574" cy="0"/>
+                <a:xfrm>
+                  <a:off x="7420406" y="1772816"/>
+                  <a:ext cx="43746" cy="4752528"/>
                 </a:xfrm>
-                <a:prstGeom prst="straightConnector1">
+                <a:prstGeom prst="line">
                   <a:avLst/>
                 </a:prstGeom>
                 <a:ln>
-                  <a:tailEnd type="triangle"/>
+                  <a:prstDash val="dash"/>
                 </a:ln>
               </p:spPr>
               <p:style>
@@ -16388,10 +16178,10 @@
             </p:cxnSp>
             <p:grpSp>
               <p:nvGrpSpPr>
-                <p:cNvPr id="19" name="Groupe 18">
+                <p:cNvPr id="3" name="Group 2">
                   <a:extLst>
                     <a:ext uri="{FF2B5EF4-FFF2-40B4-BE49-F238E27FC236}">
-                      <a16:creationId xmlns:a16="http://schemas.microsoft.com/office/drawing/2014/main" id="{CB914890-53E0-4ED3-A2D6-C5F2A3F2F084}"/>
+                      <a16:creationId xmlns:a16="http://schemas.microsoft.com/office/drawing/2014/main" id="{5ACB64DA-0D77-46E8-5553-D56209D6A336}"/>
                     </a:ext>
                   </a:extLst>
                 </p:cNvPr>
@@ -16400,21 +16190,74 @@
               </p:nvGrpSpPr>
               <p:grpSpPr>
                 <a:xfrm>
-                  <a:off x="6802759" y="4565297"/>
-                  <a:ext cx="1235297" cy="559124"/>
-                  <a:chOff x="5129784" y="2869876"/>
-                  <a:chExt cx="1235297" cy="559124"/>
+                  <a:off x="681998" y="1744053"/>
+                  <a:ext cx="9627439" cy="4198764"/>
+                  <a:chOff x="681998" y="1744053"/>
+                  <a:chExt cx="9627439" cy="4198764"/>
                 </a:xfrm>
-                <a:solidFill>
-                  <a:schemeClr val="bg1"/>
-                </a:solidFill>
               </p:grpSpPr>
+              <p:sp>
+                <p:nvSpPr>
+                  <p:cNvPr id="5" name="Rectangle: Rounded Corners 4">
+                    <a:extLst>
+                      <a:ext uri="{FF2B5EF4-FFF2-40B4-BE49-F238E27FC236}">
+                        <a16:creationId xmlns:a16="http://schemas.microsoft.com/office/drawing/2014/main" id="{93C61654-17B8-7333-F353-E006D65ABD65}"/>
+                      </a:ext>
+                    </a:extLst>
+                  </p:cNvPr>
+                  <p:cNvSpPr/>
+                  <p:nvPr/>
+                </p:nvSpPr>
+                <p:spPr>
+                  <a:xfrm>
+                    <a:off x="3120990" y="2650765"/>
+                    <a:ext cx="3465197" cy="3292052"/>
+                  </a:xfrm>
+                  <a:prstGeom prst="roundRect">
+                    <a:avLst/>
+                  </a:prstGeom>
+                  <a:solidFill>
+                    <a:schemeClr val="accent4"/>
+                  </a:solidFill>
+                  <a:ln>
+                    <a:noFill/>
+                  </a:ln>
+                </p:spPr>
+                <p:style>
+                  <a:lnRef idx="2">
+                    <a:schemeClr val="accent1">
+                      <a:shade val="50000"/>
+                    </a:schemeClr>
+                  </a:lnRef>
+                  <a:fillRef idx="1">
+                    <a:schemeClr val="accent1"/>
+                  </a:fillRef>
+                  <a:effectRef idx="0">
+                    <a:schemeClr val="accent1"/>
+                  </a:effectRef>
+                  <a:fontRef idx="minor">
+                    <a:schemeClr val="lt1"/>
+                  </a:fontRef>
+                </p:style>
+                <p:txBody>
+                  <a:bodyPr rtlCol="0" anchor="t"/>
+                  <a:lstStyle/>
+                  <a:p>
+                    <a:pPr algn="ctr"/>
+                    <a:r>
+                      <a:rPr lang="fr-FR" sz="1600" dirty="0"/>
+                      <a:t>EVENT QUEUE Thread</a:t>
+                    </a:r>
+                    <a:endParaRPr lang="en-GB" sz="1600" dirty="0"/>
+                  </a:p>
+                </p:txBody>
+              </p:sp>
               <p:grpSp>
                 <p:nvGrpSpPr>
-                  <p:cNvPr id="20" name="Groupe 19">
+                  <p:cNvPr id="14" name="Groupe 13">
                     <a:extLst>
                       <a:ext uri="{FF2B5EF4-FFF2-40B4-BE49-F238E27FC236}">
-                        <a16:creationId xmlns:a16="http://schemas.microsoft.com/office/drawing/2014/main" id="{7ADBFC2B-8128-43C0-879E-1BAA6C388A88}"/>
+                        <a16:creationId xmlns:a16="http://schemas.microsoft.com/office/drawing/2014/main" id="{BBC612B3-B30A-48BC-8354-46282A33B057}"/>
                       </a:ext>
                     </a:extLst>
                   </p:cNvPr>
@@ -16423,261 +16266,492 @@
                 </p:nvGrpSpPr>
                 <p:grpSpPr>
                   <a:xfrm>
-                    <a:off x="5129784" y="3108905"/>
-                    <a:ext cx="1235297" cy="320095"/>
-                    <a:chOff x="5129784" y="3108905"/>
-                    <a:chExt cx="1235297" cy="320095"/>
+                    <a:off x="5686248" y="4433914"/>
+                    <a:ext cx="676275" cy="796222"/>
+                    <a:chOff x="4373659" y="2977598"/>
+                    <a:chExt cx="676275" cy="796222"/>
                   </a:xfrm>
-                  <a:grpFill/>
                 </p:grpSpPr>
-                <p:sp>
-                  <p:nvSpPr>
-                    <p:cNvPr id="22" name="Rectangle 21">
+                <p:pic>
+                  <p:nvPicPr>
+                    <p:cNvPr id="15" name="Graphique 14" descr="Cercles avec flèches">
                       <a:extLst>
                         <a:ext uri="{FF2B5EF4-FFF2-40B4-BE49-F238E27FC236}">
-                          <a16:creationId xmlns:a16="http://schemas.microsoft.com/office/drawing/2014/main" id="{36DBEE8D-BE06-407A-BB1F-E8C0CCC2F2E0}"/>
+                          <a16:creationId xmlns:a16="http://schemas.microsoft.com/office/drawing/2014/main" id="{943E5DD7-36E8-4A2A-BD53-89019BD902D9}"/>
                         </a:ext>
                       </a:extLst>
                     </p:cNvPr>
-                    <p:cNvSpPr/>
+                    <p:cNvPicPr>
+                      <a:picLocks noChangeAspect="1"/>
+                    </p:cNvPicPr>
+                    <p:nvPr/>
+                  </p:nvPicPr>
+                  <p:blipFill>
+                    <a:blip r:embed="rId3" cstate="print">
+                      <a:extLst>
+                        <a:ext uri="{28A0092B-C50C-407E-A947-70E740481C1C}">
+                          <a14:useLocalDpi xmlns:a14="http://schemas.microsoft.com/office/drawing/2010/main" val="0"/>
+                        </a:ext>
+                        <a:ext uri="{96DAC541-7B7A-43D3-8B79-37D633B846F1}">
+                          <asvg:svgBlip xmlns:asvg="http://schemas.microsoft.com/office/drawing/2016/SVG/main" r:embed="rId4"/>
+                        </a:ext>
+                      </a:extLst>
+                    </a:blip>
+                    <a:stretch>
+                      <a:fillRect/>
+                    </a:stretch>
+                  </p:blipFill>
+                  <p:spPr>
+                    <a:xfrm>
+                      <a:off x="4422373" y="3194971"/>
+                      <a:ext cx="578849" cy="578849"/>
+                    </a:xfrm>
+                    <a:prstGeom prst="rect">
+                      <a:avLst/>
+                    </a:prstGeom>
+                  </p:spPr>
+                </p:pic>
+                <p:sp>
+                  <p:nvSpPr>
+                    <p:cNvPr id="16" name="ZoneTexte 15">
+                      <a:extLst>
+                        <a:ext uri="{FF2B5EF4-FFF2-40B4-BE49-F238E27FC236}">
+                          <a16:creationId xmlns:a16="http://schemas.microsoft.com/office/drawing/2014/main" id="{D73A429E-E1B0-4518-A96B-9969D3F2DDD2}"/>
+                        </a:ext>
+                      </a:extLst>
+                    </p:cNvPr>
+                    <p:cNvSpPr txBox="1"/>
                     <p:nvPr/>
                   </p:nvSpPr>
                   <p:spPr>
                     <a:xfrm>
+                      <a:off x="4373659" y="2977598"/>
+                      <a:ext cx="676275" cy="215444"/>
+                    </a:xfrm>
+                    <a:prstGeom prst="rect">
+                      <a:avLst/>
+                    </a:prstGeom>
+                    <a:noFill/>
+                  </p:spPr>
+                  <p:txBody>
+                    <a:bodyPr vert="horz" wrap="square" lIns="0" tIns="0" rIns="0" bIns="0" numCol="1" spcCol="288000" rtlCol="0" anchor="t" anchorCtr="0">
+                      <a:spAutoFit/>
+                    </a:bodyPr>
+                    <a:lstStyle/>
+                    <a:p>
+                      <a:pPr algn="ctr">
+                        <a:spcBef>
+                          <a:spcPts val="0"/>
+                        </a:spcBef>
+                        <a:spcAft>
+                          <a:spcPts val="600"/>
+                        </a:spcAft>
+                      </a:pPr>
+                      <a:r>
+                        <a:rPr lang="en-US" sz="1400" b="1" i="0" spc="0" dirty="0">
+                          <a:ln>
+                            <a:noFill/>
+                          </a:ln>
+                          <a:solidFill>
+                            <a:schemeClr val="tx2"/>
+                          </a:solidFill>
+                          <a:latin typeface="Source Sans Pro Light" charset="0"/>
+                          <a:ea typeface="Source Sans Pro Light" charset="0"/>
+                          <a:cs typeface="Source Sans Pro Light" charset="0"/>
+                        </a:rPr>
+                        <a:t>PUMP</a:t>
+                      </a:r>
+                    </a:p>
+                  </p:txBody>
+                </p:sp>
+              </p:grpSp>
+              <p:cxnSp>
+                <p:nvCxnSpPr>
+                  <p:cNvPr id="17" name="Connecteur droit avec flèche 16">
+                    <a:extLst>
+                      <a:ext uri="{FF2B5EF4-FFF2-40B4-BE49-F238E27FC236}">
+                        <a16:creationId xmlns:a16="http://schemas.microsoft.com/office/drawing/2014/main" id="{D9773D76-B1C7-4F30-9C01-4A4AFB6EC7E6}"/>
+                      </a:ext>
+                    </a:extLst>
+                  </p:cNvPr>
+                  <p:cNvCxnSpPr>
+                    <a:cxnSpLocks/>
+                  </p:cNvCxnSpPr>
+                  <p:nvPr/>
+                </p:nvCxnSpPr>
+                <p:spPr>
+                  <a:xfrm flipH="1">
+                    <a:off x="6313811" y="4941513"/>
+                    <a:ext cx="400574" cy="0"/>
+                  </a:xfrm>
+                  <a:prstGeom prst="straightConnector1">
+                    <a:avLst/>
+                  </a:prstGeom>
+                  <a:ln>
+                    <a:tailEnd type="triangle"/>
+                  </a:ln>
+                </p:spPr>
+                <p:style>
+                  <a:lnRef idx="1">
+                    <a:schemeClr val="accent1"/>
+                  </a:lnRef>
+                  <a:fillRef idx="0">
+                    <a:schemeClr val="accent1"/>
+                  </a:fillRef>
+                  <a:effectRef idx="0">
+                    <a:schemeClr val="accent1"/>
+                  </a:effectRef>
+                  <a:fontRef idx="minor">
+                    <a:schemeClr val="tx1"/>
+                  </a:fontRef>
+                </p:style>
+              </p:cxnSp>
+              <p:grpSp>
+                <p:nvGrpSpPr>
+                  <p:cNvPr id="19" name="Groupe 18">
+                    <a:extLst>
+                      <a:ext uri="{FF2B5EF4-FFF2-40B4-BE49-F238E27FC236}">
+                        <a16:creationId xmlns:a16="http://schemas.microsoft.com/office/drawing/2014/main" id="{CB914890-53E0-4ED3-A2D6-C5F2A3F2F084}"/>
+                      </a:ext>
+                    </a:extLst>
+                  </p:cNvPr>
+                  <p:cNvGrpSpPr/>
+                  <p:nvPr/>
+                </p:nvGrpSpPr>
+                <p:grpSpPr>
+                  <a:xfrm>
+                    <a:off x="6802759" y="4565297"/>
+                    <a:ext cx="1235297" cy="559124"/>
+                    <a:chOff x="5129784" y="2869876"/>
+                    <a:chExt cx="1235297" cy="559124"/>
+                  </a:xfrm>
+                  <a:solidFill>
+                    <a:schemeClr val="bg1"/>
+                  </a:solidFill>
+                </p:grpSpPr>
+                <p:grpSp>
+                  <p:nvGrpSpPr>
+                    <p:cNvPr id="20" name="Groupe 19">
+                      <a:extLst>
+                        <a:ext uri="{FF2B5EF4-FFF2-40B4-BE49-F238E27FC236}">
+                          <a16:creationId xmlns:a16="http://schemas.microsoft.com/office/drawing/2014/main" id="{7ADBFC2B-8128-43C0-879E-1BAA6C388A88}"/>
+                        </a:ext>
+                      </a:extLst>
+                    </p:cNvPr>
+                    <p:cNvGrpSpPr/>
+                    <p:nvPr/>
+                  </p:nvGrpSpPr>
+                  <p:grpSpPr>
+                    <a:xfrm>
                       <a:off x="5129784" y="3108905"/>
                       <a:ext cx="1235297" cy="320095"/>
+                      <a:chOff x="5129784" y="3108905"/>
+                      <a:chExt cx="1235297" cy="320095"/>
+                    </a:xfrm>
+                    <a:grpFill/>
+                  </p:grpSpPr>
+                  <p:sp>
+                    <p:nvSpPr>
+                      <p:cNvPr id="22" name="Rectangle 21">
+                        <a:extLst>
+                          <a:ext uri="{FF2B5EF4-FFF2-40B4-BE49-F238E27FC236}">
+                            <a16:creationId xmlns:a16="http://schemas.microsoft.com/office/drawing/2014/main" id="{36DBEE8D-BE06-407A-BB1F-E8C0CCC2F2E0}"/>
+                          </a:ext>
+                        </a:extLst>
+                      </p:cNvPr>
+                      <p:cNvSpPr/>
+                      <p:nvPr/>
+                    </p:nvSpPr>
+                    <p:spPr>
+                      <a:xfrm>
+                        <a:off x="5129784" y="3108905"/>
+                        <a:ext cx="1235297" cy="320095"/>
+                      </a:xfrm>
+                      <a:prstGeom prst="rect">
+                        <a:avLst/>
+                      </a:prstGeom>
+                      <a:grpFill/>
+                      <a:ln/>
+                    </p:spPr>
+                    <p:style>
+                      <a:lnRef idx="2">
+                        <a:schemeClr val="dk1"/>
+                      </a:lnRef>
+                      <a:fillRef idx="1">
+                        <a:schemeClr val="lt1"/>
+                      </a:fillRef>
+                      <a:effectRef idx="0">
+                        <a:schemeClr val="dk1"/>
+                      </a:effectRef>
+                      <a:fontRef idx="minor">
+                        <a:schemeClr val="dk1"/>
+                      </a:fontRef>
+                    </p:style>
+                    <p:txBody>
+                      <a:bodyPr rtlCol="0" anchor="ctr"/>
+                      <a:lstStyle/>
+                      <a:p>
+                        <a:pPr algn="ctr"/>
+                        <a:endParaRPr lang="en-US"/>
+                      </a:p>
+                    </p:txBody>
+                  </p:sp>
+                  <p:cxnSp>
+                    <p:nvCxnSpPr>
+                      <p:cNvPr id="23" name="Connecteur droit 22">
+                        <a:extLst>
+                          <a:ext uri="{FF2B5EF4-FFF2-40B4-BE49-F238E27FC236}">
+                            <a16:creationId xmlns:a16="http://schemas.microsoft.com/office/drawing/2014/main" id="{FBA6738E-B684-4B71-A2B3-983B0F1A601D}"/>
+                          </a:ext>
+                        </a:extLst>
+                      </p:cNvPr>
+                      <p:cNvCxnSpPr>
+                        <a:cxnSpLocks/>
+                      </p:cNvCxnSpPr>
+                      <p:nvPr/>
+                    </p:nvCxnSpPr>
+                    <p:spPr>
+                      <a:xfrm>
+                        <a:off x="5340096" y="3108905"/>
+                        <a:ext cx="0" cy="320095"/>
+                      </a:xfrm>
+                      <a:prstGeom prst="line">
+                        <a:avLst/>
+                      </a:prstGeom>
+                      <a:grpFill/>
+                    </p:spPr>
+                    <p:style>
+                      <a:lnRef idx="1">
+                        <a:schemeClr val="dk1"/>
+                      </a:lnRef>
+                      <a:fillRef idx="0">
+                        <a:schemeClr val="dk1"/>
+                      </a:fillRef>
+                      <a:effectRef idx="0">
+                        <a:schemeClr val="dk1"/>
+                      </a:effectRef>
+                      <a:fontRef idx="minor">
+                        <a:schemeClr val="tx1"/>
+                      </a:fontRef>
+                    </p:style>
+                  </p:cxnSp>
+                  <p:cxnSp>
+                    <p:nvCxnSpPr>
+                      <p:cNvPr id="24" name="Connecteur droit 23">
+                        <a:extLst>
+                          <a:ext uri="{FF2B5EF4-FFF2-40B4-BE49-F238E27FC236}">
+                            <a16:creationId xmlns:a16="http://schemas.microsoft.com/office/drawing/2014/main" id="{219E5D78-AA45-44AA-8832-80B322CB2021}"/>
+                          </a:ext>
+                        </a:extLst>
+                      </p:cNvPr>
+                      <p:cNvCxnSpPr>
+                        <a:cxnSpLocks/>
+                      </p:cNvCxnSpPr>
+                      <p:nvPr/>
+                    </p:nvCxnSpPr>
+                    <p:spPr>
+                      <a:xfrm>
+                        <a:off x="5545479" y="3108905"/>
+                        <a:ext cx="0" cy="320095"/>
+                      </a:xfrm>
+                      <a:prstGeom prst="line">
+                        <a:avLst/>
+                      </a:prstGeom>
+                      <a:grpFill/>
+                    </p:spPr>
+                    <p:style>
+                      <a:lnRef idx="1">
+                        <a:schemeClr val="dk1"/>
+                      </a:lnRef>
+                      <a:fillRef idx="0">
+                        <a:schemeClr val="dk1"/>
+                      </a:fillRef>
+                      <a:effectRef idx="0">
+                        <a:schemeClr val="dk1"/>
+                      </a:effectRef>
+                      <a:fontRef idx="minor">
+                        <a:schemeClr val="tx1"/>
+                      </a:fontRef>
+                    </p:style>
+                  </p:cxnSp>
+                  <p:cxnSp>
+                    <p:nvCxnSpPr>
+                      <p:cNvPr id="25" name="Connecteur droit 24">
+                        <a:extLst>
+                          <a:ext uri="{FF2B5EF4-FFF2-40B4-BE49-F238E27FC236}">
+                            <a16:creationId xmlns:a16="http://schemas.microsoft.com/office/drawing/2014/main" id="{6BA59107-41D7-468C-B908-DA426AF186A5}"/>
+                          </a:ext>
+                        </a:extLst>
+                      </p:cNvPr>
+                      <p:cNvCxnSpPr>
+                        <a:cxnSpLocks/>
+                      </p:cNvCxnSpPr>
+                      <p:nvPr/>
+                    </p:nvCxnSpPr>
+                    <p:spPr>
+                      <a:xfrm>
+                        <a:off x="5750862" y="3108905"/>
+                        <a:ext cx="0" cy="320095"/>
+                      </a:xfrm>
+                      <a:prstGeom prst="line">
+                        <a:avLst/>
+                      </a:prstGeom>
+                      <a:grpFill/>
+                    </p:spPr>
+                    <p:style>
+                      <a:lnRef idx="1">
+                        <a:schemeClr val="dk1"/>
+                      </a:lnRef>
+                      <a:fillRef idx="0">
+                        <a:schemeClr val="dk1"/>
+                      </a:fillRef>
+                      <a:effectRef idx="0">
+                        <a:schemeClr val="dk1"/>
+                      </a:effectRef>
+                      <a:fontRef idx="minor">
+                        <a:schemeClr val="tx1"/>
+                      </a:fontRef>
+                    </p:style>
+                  </p:cxnSp>
+                  <p:cxnSp>
+                    <p:nvCxnSpPr>
+                      <p:cNvPr id="26" name="Connecteur droit 25">
+                        <a:extLst>
+                          <a:ext uri="{FF2B5EF4-FFF2-40B4-BE49-F238E27FC236}">
+                            <a16:creationId xmlns:a16="http://schemas.microsoft.com/office/drawing/2014/main" id="{414F2C6F-1E94-4234-A2BC-CCEA151B650F}"/>
+                          </a:ext>
+                        </a:extLst>
+                      </p:cNvPr>
+                      <p:cNvCxnSpPr>
+                        <a:cxnSpLocks/>
+                      </p:cNvCxnSpPr>
+                      <p:nvPr/>
+                    </p:nvCxnSpPr>
+                    <p:spPr>
+                      <a:xfrm>
+                        <a:off x="5956245" y="3108905"/>
+                        <a:ext cx="0" cy="320095"/>
+                      </a:xfrm>
+                      <a:prstGeom prst="line">
+                        <a:avLst/>
+                      </a:prstGeom>
+                      <a:grpFill/>
+                    </p:spPr>
+                    <p:style>
+                      <a:lnRef idx="1">
+                        <a:schemeClr val="dk1"/>
+                      </a:lnRef>
+                      <a:fillRef idx="0">
+                        <a:schemeClr val="dk1"/>
+                      </a:fillRef>
+                      <a:effectRef idx="0">
+                        <a:schemeClr val="dk1"/>
+                      </a:effectRef>
+                      <a:fontRef idx="minor">
+                        <a:schemeClr val="tx1"/>
+                      </a:fontRef>
+                    </p:style>
+                  </p:cxnSp>
+                  <p:cxnSp>
+                    <p:nvCxnSpPr>
+                      <p:cNvPr id="27" name="Connecteur droit 26">
+                        <a:extLst>
+                          <a:ext uri="{FF2B5EF4-FFF2-40B4-BE49-F238E27FC236}">
+                            <a16:creationId xmlns:a16="http://schemas.microsoft.com/office/drawing/2014/main" id="{1B436767-23B2-42AD-81F4-CCFF5709BA7A}"/>
+                          </a:ext>
+                        </a:extLst>
+                      </p:cNvPr>
+                      <p:cNvCxnSpPr>
+                        <a:cxnSpLocks/>
+                      </p:cNvCxnSpPr>
+                      <p:nvPr/>
+                    </p:nvCxnSpPr>
+                    <p:spPr>
+                      <a:xfrm>
+                        <a:off x="6161628" y="3108905"/>
+                        <a:ext cx="0" cy="320095"/>
+                      </a:xfrm>
+                      <a:prstGeom prst="line">
+                        <a:avLst/>
+                      </a:prstGeom>
+                      <a:grpFill/>
+                    </p:spPr>
+                    <p:style>
+                      <a:lnRef idx="1">
+                        <a:schemeClr val="dk1"/>
+                      </a:lnRef>
+                      <a:fillRef idx="0">
+                        <a:schemeClr val="dk1"/>
+                      </a:fillRef>
+                      <a:effectRef idx="0">
+                        <a:schemeClr val="dk1"/>
+                      </a:effectRef>
+                      <a:fontRef idx="minor">
+                        <a:schemeClr val="tx1"/>
+                      </a:fontRef>
+                    </p:style>
+                  </p:cxnSp>
+                </p:grpSp>
+                <p:sp>
+                  <p:nvSpPr>
+                    <p:cNvPr id="21" name="ZoneTexte 20">
+                      <a:extLst>
+                        <a:ext uri="{FF2B5EF4-FFF2-40B4-BE49-F238E27FC236}">
+                          <a16:creationId xmlns:a16="http://schemas.microsoft.com/office/drawing/2014/main" id="{04315B2B-2F50-40AE-88E4-A6597FA866F2}"/>
+                        </a:ext>
+                      </a:extLst>
+                    </p:cNvPr>
+                    <p:cNvSpPr txBox="1"/>
+                    <p:nvPr/>
+                  </p:nvSpPr>
+                  <p:spPr>
+                    <a:xfrm>
+                      <a:off x="5409294" y="2869876"/>
+                      <a:ext cx="676275" cy="215444"/>
                     </a:xfrm>
                     <a:prstGeom prst="rect">
                       <a:avLst/>
                     </a:prstGeom>
                     <a:grpFill/>
-                    <a:ln/>
                   </p:spPr>
-                  <p:style>
-                    <a:lnRef idx="2">
-                      <a:schemeClr val="dk1"/>
-                    </a:lnRef>
-                    <a:fillRef idx="1">
-                      <a:schemeClr val="lt1"/>
-                    </a:fillRef>
-                    <a:effectRef idx="0">
-                      <a:schemeClr val="dk1"/>
-                    </a:effectRef>
-                    <a:fontRef idx="minor">
-                      <a:schemeClr val="dk1"/>
-                    </a:fontRef>
-                  </p:style>
                   <p:txBody>
-                    <a:bodyPr rtlCol="0" anchor="ctr"/>
+                    <a:bodyPr vert="horz" wrap="square" lIns="0" tIns="0" rIns="0" bIns="0" numCol="1" spcCol="288000" rtlCol="0" anchor="t" anchorCtr="0">
+                      <a:spAutoFit/>
+                    </a:bodyPr>
                     <a:lstStyle/>
                     <a:p>
-                      <a:pPr algn="ctr"/>
-                      <a:endParaRPr lang="en-US"/>
+                      <a:pPr algn="ctr">
+                        <a:spcBef>
+                          <a:spcPts val="0"/>
+                        </a:spcBef>
+                        <a:spcAft>
+                          <a:spcPts val="600"/>
+                        </a:spcAft>
+                      </a:pPr>
+                      <a:r>
+                        <a:rPr lang="en-US" sz="1400" b="1" i="0" spc="0" dirty="0">
+                          <a:ln>
+                            <a:noFill/>
+                          </a:ln>
+                          <a:solidFill>
+                            <a:schemeClr val="tx2"/>
+                          </a:solidFill>
+                          <a:latin typeface="Source Sans Pro Light" charset="0"/>
+                          <a:ea typeface="Source Sans Pro Light" charset="0"/>
+                          <a:cs typeface="Source Sans Pro Light" charset="0"/>
+                        </a:rPr>
+                        <a:t>FIFO</a:t>
+                      </a:r>
                     </a:p>
                   </p:txBody>
                 </p:sp>
-                <p:cxnSp>
-                  <p:nvCxnSpPr>
-                    <p:cNvPr id="23" name="Connecteur droit 22">
-                      <a:extLst>
-                        <a:ext uri="{FF2B5EF4-FFF2-40B4-BE49-F238E27FC236}">
-                          <a16:creationId xmlns:a16="http://schemas.microsoft.com/office/drawing/2014/main" id="{FBA6738E-B684-4B71-A2B3-983B0F1A601D}"/>
-                        </a:ext>
-                      </a:extLst>
-                    </p:cNvPr>
-                    <p:cNvCxnSpPr>
-                      <a:cxnSpLocks/>
-                    </p:cNvCxnSpPr>
-                    <p:nvPr/>
-                  </p:nvCxnSpPr>
-                  <p:spPr>
-                    <a:xfrm>
-                      <a:off x="5340096" y="3108905"/>
-                      <a:ext cx="0" cy="320095"/>
-                    </a:xfrm>
-                    <a:prstGeom prst="line">
-                      <a:avLst/>
-                    </a:prstGeom>
-                    <a:grpFill/>
-                  </p:spPr>
-                  <p:style>
-                    <a:lnRef idx="1">
-                      <a:schemeClr val="dk1"/>
-                    </a:lnRef>
-                    <a:fillRef idx="0">
-                      <a:schemeClr val="dk1"/>
-                    </a:fillRef>
-                    <a:effectRef idx="0">
-                      <a:schemeClr val="dk1"/>
-                    </a:effectRef>
-                    <a:fontRef idx="minor">
-                      <a:schemeClr val="tx1"/>
-                    </a:fontRef>
-                  </p:style>
-                </p:cxnSp>
-                <p:cxnSp>
-                  <p:nvCxnSpPr>
-                    <p:cNvPr id="24" name="Connecteur droit 23">
-                      <a:extLst>
-                        <a:ext uri="{FF2B5EF4-FFF2-40B4-BE49-F238E27FC236}">
-                          <a16:creationId xmlns:a16="http://schemas.microsoft.com/office/drawing/2014/main" id="{219E5D78-AA45-44AA-8832-80B322CB2021}"/>
-                        </a:ext>
-                      </a:extLst>
-                    </p:cNvPr>
-                    <p:cNvCxnSpPr>
-                      <a:cxnSpLocks/>
-                    </p:cNvCxnSpPr>
-                    <p:nvPr/>
-                  </p:nvCxnSpPr>
-                  <p:spPr>
-                    <a:xfrm>
-                      <a:off x="5545479" y="3108905"/>
-                      <a:ext cx="0" cy="320095"/>
-                    </a:xfrm>
-                    <a:prstGeom prst="line">
-                      <a:avLst/>
-                    </a:prstGeom>
-                    <a:grpFill/>
-                  </p:spPr>
-                  <p:style>
-                    <a:lnRef idx="1">
-                      <a:schemeClr val="dk1"/>
-                    </a:lnRef>
-                    <a:fillRef idx="0">
-                      <a:schemeClr val="dk1"/>
-                    </a:fillRef>
-                    <a:effectRef idx="0">
-                      <a:schemeClr val="dk1"/>
-                    </a:effectRef>
-                    <a:fontRef idx="minor">
-                      <a:schemeClr val="tx1"/>
-                    </a:fontRef>
-                  </p:style>
-                </p:cxnSp>
-                <p:cxnSp>
-                  <p:nvCxnSpPr>
-                    <p:cNvPr id="25" name="Connecteur droit 24">
-                      <a:extLst>
-                        <a:ext uri="{FF2B5EF4-FFF2-40B4-BE49-F238E27FC236}">
-                          <a16:creationId xmlns:a16="http://schemas.microsoft.com/office/drawing/2014/main" id="{6BA59107-41D7-468C-B908-DA426AF186A5}"/>
-                        </a:ext>
-                      </a:extLst>
-                    </p:cNvPr>
-                    <p:cNvCxnSpPr>
-                      <a:cxnSpLocks/>
-                    </p:cNvCxnSpPr>
-                    <p:nvPr/>
-                  </p:nvCxnSpPr>
-                  <p:spPr>
-                    <a:xfrm>
-                      <a:off x="5750862" y="3108905"/>
-                      <a:ext cx="0" cy="320095"/>
-                    </a:xfrm>
-                    <a:prstGeom prst="line">
-                      <a:avLst/>
-                    </a:prstGeom>
-                    <a:grpFill/>
-                  </p:spPr>
-                  <p:style>
-                    <a:lnRef idx="1">
-                      <a:schemeClr val="dk1"/>
-                    </a:lnRef>
-                    <a:fillRef idx="0">
-                      <a:schemeClr val="dk1"/>
-                    </a:fillRef>
-                    <a:effectRef idx="0">
-                      <a:schemeClr val="dk1"/>
-                    </a:effectRef>
-                    <a:fontRef idx="minor">
-                      <a:schemeClr val="tx1"/>
-                    </a:fontRef>
-                  </p:style>
-                </p:cxnSp>
-                <p:cxnSp>
-                  <p:nvCxnSpPr>
-                    <p:cNvPr id="26" name="Connecteur droit 25">
-                      <a:extLst>
-                        <a:ext uri="{FF2B5EF4-FFF2-40B4-BE49-F238E27FC236}">
-                          <a16:creationId xmlns:a16="http://schemas.microsoft.com/office/drawing/2014/main" id="{414F2C6F-1E94-4234-A2BC-CCEA151B650F}"/>
-                        </a:ext>
-                      </a:extLst>
-                    </p:cNvPr>
-                    <p:cNvCxnSpPr>
-                      <a:cxnSpLocks/>
-                    </p:cNvCxnSpPr>
-                    <p:nvPr/>
-                  </p:nvCxnSpPr>
-                  <p:spPr>
-                    <a:xfrm>
-                      <a:off x="5956245" y="3108905"/>
-                      <a:ext cx="0" cy="320095"/>
-                    </a:xfrm>
-                    <a:prstGeom prst="line">
-                      <a:avLst/>
-                    </a:prstGeom>
-                    <a:grpFill/>
-                  </p:spPr>
-                  <p:style>
-                    <a:lnRef idx="1">
-                      <a:schemeClr val="dk1"/>
-                    </a:lnRef>
-                    <a:fillRef idx="0">
-                      <a:schemeClr val="dk1"/>
-                    </a:fillRef>
-                    <a:effectRef idx="0">
-                      <a:schemeClr val="dk1"/>
-                    </a:effectRef>
-                    <a:fontRef idx="minor">
-                      <a:schemeClr val="tx1"/>
-                    </a:fontRef>
-                  </p:style>
-                </p:cxnSp>
-                <p:cxnSp>
-                  <p:nvCxnSpPr>
-                    <p:cNvPr id="27" name="Connecteur droit 26">
-                      <a:extLst>
-                        <a:ext uri="{FF2B5EF4-FFF2-40B4-BE49-F238E27FC236}">
-                          <a16:creationId xmlns:a16="http://schemas.microsoft.com/office/drawing/2014/main" id="{1B436767-23B2-42AD-81F4-CCFF5709BA7A}"/>
-                        </a:ext>
-                      </a:extLst>
-                    </p:cNvPr>
-                    <p:cNvCxnSpPr>
-                      <a:cxnSpLocks/>
-                    </p:cNvCxnSpPr>
-                    <p:nvPr/>
-                  </p:nvCxnSpPr>
-                  <p:spPr>
-                    <a:xfrm>
-                      <a:off x="6161628" y="3108905"/>
-                      <a:ext cx="0" cy="320095"/>
-                    </a:xfrm>
-                    <a:prstGeom prst="line">
-                      <a:avLst/>
-                    </a:prstGeom>
-                    <a:grpFill/>
-                  </p:spPr>
-                  <p:style>
-                    <a:lnRef idx="1">
-                      <a:schemeClr val="dk1"/>
-                    </a:lnRef>
-                    <a:fillRef idx="0">
-                      <a:schemeClr val="dk1"/>
-                    </a:fillRef>
-                    <a:effectRef idx="0">
-                      <a:schemeClr val="dk1"/>
-                    </a:effectRef>
-                    <a:fontRef idx="minor">
-                      <a:schemeClr val="tx1"/>
-                    </a:fontRef>
-                  </p:style>
-                </p:cxnSp>
               </p:grpSp>
               <p:sp>
                 <p:nvSpPr>
-                  <p:cNvPr id="21" name="ZoneTexte 20">
+                  <p:cNvPr id="28" name="ZoneTexte 27">
                     <a:extLst>
                       <a:ext uri="{FF2B5EF4-FFF2-40B4-BE49-F238E27FC236}">
-                        <a16:creationId xmlns:a16="http://schemas.microsoft.com/office/drawing/2014/main" id="{04315B2B-2F50-40AE-88E4-A6597FA866F2}"/>
+                        <a16:creationId xmlns:a16="http://schemas.microsoft.com/office/drawing/2014/main" id="{46C8F507-29C6-4CF9-B8D9-7D056699B26B}"/>
                       </a:ext>
                     </a:extLst>
                   </p:cNvPr>
@@ -16686,13 +16760,13 @@
                 </p:nvSpPr>
                 <p:spPr>
                   <a:xfrm>
-                    <a:off x="5409294" y="2869876"/>
-                    <a:ext cx="676275" cy="215444"/>
+                    <a:off x="6586324" y="5161010"/>
+                    <a:ext cx="690267" cy="215444"/>
                   </a:xfrm>
                   <a:prstGeom prst="rect">
                     <a:avLst/>
                   </a:prstGeom>
-                  <a:grpFill/>
+                  <a:noFill/>
                 </p:spPr>
                 <p:txBody>
                   <a:bodyPr vert="horz" wrap="square" lIns="0" tIns="0" rIns="0" bIns="0" numCol="1" spcCol="288000" rtlCol="0" anchor="t" anchorCtr="0">
@@ -16700,7 +16774,7 @@
                   </a:bodyPr>
                   <a:lstStyle/>
                   <a:p>
-                    <a:pPr algn="ctr">
+                    <a:pPr algn="l">
                       <a:spcBef>
                         <a:spcPts val="0"/>
                       </a:spcBef>
@@ -16709,7 +16783,7 @@
                       </a:spcAft>
                     </a:pPr>
                     <a:r>
-                      <a:rPr lang="en-US" sz="1400" b="1" i="0" spc="0" dirty="0">
+                      <a:rPr lang="en-US" sz="1400" b="0" i="0" spc="0" dirty="0">
                         <a:ln>
                           <a:noFill/>
                         </a:ln>
@@ -16720,50 +16794,111 @@
                         <a:ea typeface="Source Sans Pro Light" charset="0"/>
                         <a:cs typeface="Source Sans Pro Light" charset="0"/>
                       </a:rPr>
-                      <a:t>FIFO</a:t>
+                      <a:t>POP</a:t>
                     </a:r>
                   </a:p>
                 </p:txBody>
               </p:sp>
-            </p:grpSp>
-            <p:sp>
-              <p:nvSpPr>
-                <p:cNvPr id="28" name="ZoneTexte 27">
-                  <a:extLst>
-                    <a:ext uri="{FF2B5EF4-FFF2-40B4-BE49-F238E27FC236}">
-                      <a16:creationId xmlns:a16="http://schemas.microsoft.com/office/drawing/2014/main" id="{46C8F507-29C6-4CF9-B8D9-7D056699B26B}"/>
-                    </a:ext>
-                  </a:extLst>
-                </p:cNvPr>
-                <p:cNvSpPr txBox="1"/>
-                <p:nvPr/>
-              </p:nvSpPr>
-              <p:spPr>
-                <a:xfrm>
-                  <a:off x="6586324" y="5161010"/>
-                  <a:ext cx="690267" cy="215444"/>
-                </a:xfrm>
-                <a:prstGeom prst="rect">
-                  <a:avLst/>
-                </a:prstGeom>
-                <a:noFill/>
-              </p:spPr>
-              <p:txBody>
-                <a:bodyPr vert="horz" wrap="square" lIns="0" tIns="0" rIns="0" bIns="0" numCol="1" spcCol="288000" rtlCol="0" anchor="t" anchorCtr="0">
-                  <a:spAutoFit/>
-                </a:bodyPr>
-                <a:lstStyle/>
-                <a:p>
-                  <a:pPr algn="l">
-                    <a:spcBef>
-                      <a:spcPts val="0"/>
-                    </a:spcBef>
-                    <a:spcAft>
-                      <a:spcPts val="600"/>
-                    </a:spcAft>
-                  </a:pPr>
-                  <a:r>
-                    <a:rPr lang="en-US" sz="1400" b="0" i="0" spc="0" dirty="0">
+              <p:sp>
+                <p:nvSpPr>
+                  <p:cNvPr id="2" name="Rectangle : coins arrondis 1">
+                    <a:extLst>
+                      <a:ext uri="{FF2B5EF4-FFF2-40B4-BE49-F238E27FC236}">
+                        <a16:creationId xmlns:a16="http://schemas.microsoft.com/office/drawing/2014/main" id="{6E43BCF7-C3F5-453F-BDDD-D326CA975BCA}"/>
+                      </a:ext>
+                    </a:extLst>
+                  </p:cNvPr>
+                  <p:cNvSpPr/>
+                  <p:nvPr/>
+                </p:nvSpPr>
+                <p:spPr>
+                  <a:xfrm>
+                    <a:off x="3719358" y="3489960"/>
+                    <a:ext cx="1441138" cy="480702"/>
+                  </a:xfrm>
+                  <a:prstGeom prst="roundRect">
+                    <a:avLst/>
+                  </a:prstGeom>
+                  <a:ln>
+                    <a:noFill/>
+                  </a:ln>
+                </p:spPr>
+                <p:style>
+                  <a:lnRef idx="2">
+                    <a:schemeClr val="accent1">
+                      <a:shade val="50000"/>
+                    </a:schemeClr>
+                  </a:lnRef>
+                  <a:fillRef idx="1">
+                    <a:schemeClr val="accent1"/>
+                  </a:fillRef>
+                  <a:effectRef idx="0">
+                    <a:schemeClr val="accent1"/>
+                  </a:effectRef>
+                  <a:fontRef idx="minor">
+                    <a:schemeClr val="lt1"/>
+                  </a:fontRef>
+                </p:style>
+                <p:txBody>
+                  <a:bodyPr rtlCol="0" anchor="ctr"/>
+                  <a:lstStyle/>
+                  <a:p>
+                    <a:pPr algn="ctr"/>
+                    <a:r>
+                      <a:rPr lang="en-US" sz="1400" dirty="0"/>
+                      <a:t>Call to a Java method</a:t>
+                    </a:r>
+                  </a:p>
+                </p:txBody>
+              </p:sp>
+              <p:sp>
+                <p:nvSpPr>
+                  <p:cNvPr id="46" name="ZoneTexte 45">
+                    <a:extLst>
+                      <a:ext uri="{FF2B5EF4-FFF2-40B4-BE49-F238E27FC236}">
+                        <a16:creationId xmlns:a16="http://schemas.microsoft.com/office/drawing/2014/main" id="{8FDD7CD3-EF4B-4902-B07C-B6F495D9FAB1}"/>
+                      </a:ext>
+                    </a:extLst>
+                  </p:cNvPr>
+                  <p:cNvSpPr txBox="1"/>
+                  <p:nvPr/>
+                </p:nvSpPr>
+                <p:spPr>
+                  <a:xfrm>
+                    <a:off x="8110070" y="4692644"/>
+                    <a:ext cx="440030" cy="215444"/>
+                  </a:xfrm>
+                  <a:prstGeom prst="rect">
+                    <a:avLst/>
+                  </a:prstGeom>
+                  <a:noFill/>
+                </p:spPr>
+                <p:txBody>
+                  <a:bodyPr vert="horz" wrap="square" lIns="0" tIns="0" rIns="0" bIns="0" numCol="1" spcCol="288000" rtlCol="0" anchor="t" anchorCtr="0">
+                    <a:spAutoFit/>
+                  </a:bodyPr>
+                  <a:lstStyle/>
+                  <a:p>
+                    <a:pPr algn="l">
+                      <a:spcBef>
+                        <a:spcPts val="0"/>
+                      </a:spcBef>
+                      <a:spcAft>
+                        <a:spcPts val="600"/>
+                      </a:spcAft>
+                    </a:pPr>
+                    <a:r>
+                      <a:rPr lang="en-US" sz="1400" dirty="0">
+                        <a:solidFill>
+                          <a:schemeClr val="tx2"/>
+                        </a:solidFill>
+                        <a:latin typeface="Source Sans Pro Light" charset="0"/>
+                        <a:ea typeface="Source Sans Pro Light" charset="0"/>
+                        <a:cs typeface="Source Sans Pro Light" charset="0"/>
+                      </a:rPr>
+                      <a:t>PUSH</a:t>
+                    </a:r>
+                    <a:endParaRPr lang="en-US" sz="1400" b="0" i="0" spc="0" dirty="0">
                       <a:ln>
                         <a:noFill/>
                       </a:ln>
@@ -16773,151 +16908,16 @@
                       <a:latin typeface="Source Sans Pro Light" charset="0"/>
                       <a:ea typeface="Source Sans Pro Light" charset="0"/>
                       <a:cs typeface="Source Sans Pro Light" charset="0"/>
-                    </a:rPr>
-                    <a:t>POP</a:t>
-                  </a:r>
-                </a:p>
-              </p:txBody>
-            </p:sp>
-            <p:sp>
-              <p:nvSpPr>
-                <p:cNvPr id="2" name="Rectangle : coins arrondis 1">
-                  <a:extLst>
-                    <a:ext uri="{FF2B5EF4-FFF2-40B4-BE49-F238E27FC236}">
-                      <a16:creationId xmlns:a16="http://schemas.microsoft.com/office/drawing/2014/main" id="{6E43BCF7-C3F5-453F-BDDD-D326CA975BCA}"/>
-                    </a:ext>
-                  </a:extLst>
-                </p:cNvPr>
-                <p:cNvSpPr/>
-                <p:nvPr/>
-              </p:nvSpPr>
-              <p:spPr>
-                <a:xfrm>
-                  <a:off x="3719358" y="3489960"/>
-                  <a:ext cx="1441138" cy="480702"/>
-                </a:xfrm>
-                <a:prstGeom prst="roundRect">
-                  <a:avLst/>
-                </a:prstGeom>
-                <a:ln>
-                  <a:noFill/>
-                </a:ln>
-              </p:spPr>
-              <p:style>
-                <a:lnRef idx="2">
-                  <a:schemeClr val="accent1">
-                    <a:shade val="50000"/>
-                  </a:schemeClr>
-                </a:lnRef>
-                <a:fillRef idx="1">
-                  <a:schemeClr val="accent1"/>
-                </a:fillRef>
-                <a:effectRef idx="0">
-                  <a:schemeClr val="accent1"/>
-                </a:effectRef>
-                <a:fontRef idx="minor">
-                  <a:schemeClr val="lt1"/>
-                </a:fontRef>
-              </p:style>
-              <p:txBody>
-                <a:bodyPr rtlCol="0" anchor="ctr"/>
-                <a:lstStyle/>
-                <a:p>
-                  <a:pPr algn="ctr"/>
-                  <a:r>
-                    <a:rPr lang="en-US" sz="1400" dirty="0"/>
-                    <a:t>Call to a Java method</a:t>
-                  </a:r>
-                </a:p>
-              </p:txBody>
-            </p:sp>
-            <p:sp>
-              <p:nvSpPr>
-                <p:cNvPr id="46" name="ZoneTexte 45">
-                  <a:extLst>
-                    <a:ext uri="{FF2B5EF4-FFF2-40B4-BE49-F238E27FC236}">
-                      <a16:creationId xmlns:a16="http://schemas.microsoft.com/office/drawing/2014/main" id="{8FDD7CD3-EF4B-4902-B07C-B6F495D9FAB1}"/>
-                    </a:ext>
-                  </a:extLst>
-                </p:cNvPr>
-                <p:cNvSpPr txBox="1"/>
-                <p:nvPr/>
-              </p:nvSpPr>
-              <p:spPr>
-                <a:xfrm>
-                  <a:off x="8110070" y="4692644"/>
-                  <a:ext cx="440030" cy="215444"/>
-                </a:xfrm>
-                <a:prstGeom prst="rect">
-                  <a:avLst/>
-                </a:prstGeom>
-                <a:noFill/>
-              </p:spPr>
-              <p:txBody>
-                <a:bodyPr vert="horz" wrap="square" lIns="0" tIns="0" rIns="0" bIns="0" numCol="1" spcCol="288000" rtlCol="0" anchor="t" anchorCtr="0">
-                  <a:spAutoFit/>
-                </a:bodyPr>
-                <a:lstStyle/>
-                <a:p>
-                  <a:pPr algn="l">
-                    <a:spcBef>
-                      <a:spcPts val="0"/>
-                    </a:spcBef>
-                    <a:spcAft>
-                      <a:spcPts val="600"/>
-                    </a:spcAft>
-                  </a:pPr>
-                  <a:r>
-                    <a:rPr lang="en-US" sz="1400" dirty="0">
-                      <a:solidFill>
-                        <a:schemeClr val="tx2"/>
-                      </a:solidFill>
-                      <a:latin typeface="Source Sans Pro Light" charset="0"/>
-                      <a:ea typeface="Source Sans Pro Light" charset="0"/>
-                      <a:cs typeface="Source Sans Pro Light" charset="0"/>
-                    </a:rPr>
-                    <a:t>PUSH</a:t>
-                  </a:r>
-                  <a:endParaRPr lang="en-US" sz="1400" b="0" i="0" spc="0" dirty="0">
-                    <a:ln>
-                      <a:noFill/>
-                    </a:ln>
-                    <a:solidFill>
-                      <a:schemeClr val="tx2"/>
-                    </a:solidFill>
-                    <a:latin typeface="Source Sans Pro Light" charset="0"/>
-                    <a:ea typeface="Source Sans Pro Light" charset="0"/>
-                    <a:cs typeface="Source Sans Pro Light" charset="0"/>
-                  </a:endParaRPr>
-                </a:p>
-              </p:txBody>
-            </p:sp>
-            <p:grpSp>
-              <p:nvGrpSpPr>
-                <p:cNvPr id="61" name="Groupe 60">
-                  <a:extLst>
-                    <a:ext uri="{FF2B5EF4-FFF2-40B4-BE49-F238E27FC236}">
-                      <a16:creationId xmlns:a16="http://schemas.microsoft.com/office/drawing/2014/main" id="{E4E68BC0-705B-48FA-ADAB-358D65000B53}"/>
-                    </a:ext>
-                  </a:extLst>
-                </p:cNvPr>
-                <p:cNvGrpSpPr/>
-                <p:nvPr/>
-              </p:nvGrpSpPr>
-              <p:grpSpPr>
-                <a:xfrm>
-                  <a:off x="3499823" y="4112559"/>
-                  <a:ext cx="1804089" cy="1656304"/>
-                  <a:chOff x="1225763" y="3495829"/>
-                  <a:chExt cx="1804089" cy="1656304"/>
-                </a:xfrm>
-              </p:grpSpPr>
+                    </a:endParaRPr>
+                  </a:p>
+                </p:txBody>
+              </p:sp>
               <p:grpSp>
                 <p:nvGrpSpPr>
-                  <p:cNvPr id="59" name="Groupe 58">
+                  <p:cNvPr id="61" name="Groupe 60">
                     <a:extLst>
                       <a:ext uri="{FF2B5EF4-FFF2-40B4-BE49-F238E27FC236}">
-                        <a16:creationId xmlns:a16="http://schemas.microsoft.com/office/drawing/2014/main" id="{90AE7012-0058-47C0-8EB1-71B475C6E9C1}"/>
+                        <a16:creationId xmlns:a16="http://schemas.microsoft.com/office/drawing/2014/main" id="{E4E68BC0-705B-48FA-ADAB-358D65000B53}"/>
                       </a:ext>
                     </a:extLst>
                   </p:cNvPr>
@@ -16926,18 +16926,249 @@
                 </p:nvGrpSpPr>
                 <p:grpSpPr>
                   <a:xfrm>
-                    <a:off x="1225763" y="3495829"/>
+                    <a:off x="3499823" y="4112559"/>
                     <a:ext cx="1804089" cy="1656304"/>
                     <a:chOff x="1225763" y="3495829"/>
                     <a:chExt cx="1804089" cy="1656304"/>
                   </a:xfrm>
                 </p:grpSpPr>
+                <p:grpSp>
+                  <p:nvGrpSpPr>
+                    <p:cNvPr id="59" name="Groupe 58">
+                      <a:extLst>
+                        <a:ext uri="{FF2B5EF4-FFF2-40B4-BE49-F238E27FC236}">
+                          <a16:creationId xmlns:a16="http://schemas.microsoft.com/office/drawing/2014/main" id="{90AE7012-0058-47C0-8EB1-71B475C6E9C1}"/>
+                        </a:ext>
+                      </a:extLst>
+                    </p:cNvPr>
+                    <p:cNvGrpSpPr/>
+                    <p:nvPr/>
+                  </p:nvGrpSpPr>
+                  <p:grpSpPr>
+                    <a:xfrm>
+                      <a:off x="1225763" y="3495829"/>
+                      <a:ext cx="1804089" cy="1656304"/>
+                      <a:chOff x="1225763" y="3495829"/>
+                      <a:chExt cx="1804089" cy="1656304"/>
+                    </a:xfrm>
+                  </p:grpSpPr>
+                  <p:sp>
+                    <p:nvSpPr>
+                      <p:cNvPr id="55" name="Rectangle 54">
+                        <a:extLst>
+                          <a:ext uri="{FF2B5EF4-FFF2-40B4-BE49-F238E27FC236}">
+                            <a16:creationId xmlns:a16="http://schemas.microsoft.com/office/drawing/2014/main" id="{89450EE5-46EA-491D-8853-1D4BBDFE78E7}"/>
+                          </a:ext>
+                        </a:extLst>
+                      </p:cNvPr>
+                      <p:cNvSpPr/>
+                      <p:nvPr/>
+                    </p:nvSpPr>
+                    <p:spPr>
+                      <a:xfrm>
+                        <a:off x="1326095" y="3838110"/>
+                        <a:ext cx="1611095" cy="358172"/>
+                      </a:xfrm>
+                      <a:prstGeom prst="rect">
+                        <a:avLst/>
+                      </a:prstGeom>
+                      <a:ln>
+                        <a:noFill/>
+                      </a:ln>
+                    </p:spPr>
+                    <p:style>
+                      <a:lnRef idx="2">
+                        <a:schemeClr val="accent1">
+                          <a:shade val="50000"/>
+                        </a:schemeClr>
+                      </a:lnRef>
+                      <a:fillRef idx="1">
+                        <a:schemeClr val="accent1"/>
+                      </a:fillRef>
+                      <a:effectRef idx="0">
+                        <a:schemeClr val="accent1"/>
+                      </a:effectRef>
+                      <a:fontRef idx="minor">
+                        <a:schemeClr val="lt1"/>
+                      </a:fontRef>
+                    </p:style>
+                    <p:txBody>
+                      <a:bodyPr rtlCol="0" anchor="ctr"/>
+                      <a:lstStyle/>
+                      <a:p>
+                        <a:pPr algn="ctr"/>
+                        <a:r>
+                          <a:rPr lang="en-US" sz="1400" dirty="0"/>
+                          <a:t>Event Listener A</a:t>
+                        </a:r>
+                      </a:p>
+                    </p:txBody>
+                  </p:sp>
+                  <p:sp>
+                    <p:nvSpPr>
+                      <p:cNvPr id="56" name="Rectangle 55">
+                        <a:extLst>
+                          <a:ext uri="{FF2B5EF4-FFF2-40B4-BE49-F238E27FC236}">
+                            <a16:creationId xmlns:a16="http://schemas.microsoft.com/office/drawing/2014/main" id="{BC8F0D09-9FE4-4F3D-9623-C86591172330}"/>
+                          </a:ext>
+                        </a:extLst>
+                      </p:cNvPr>
+                      <p:cNvSpPr/>
+                      <p:nvPr/>
+                    </p:nvSpPr>
+                    <p:spPr>
+                      <a:xfrm>
+                        <a:off x="1326095" y="4288438"/>
+                        <a:ext cx="1611095" cy="358172"/>
+                      </a:xfrm>
+                      <a:prstGeom prst="rect">
+                        <a:avLst/>
+                      </a:prstGeom>
+                      <a:ln>
+                        <a:noFill/>
+                      </a:ln>
+                    </p:spPr>
+                    <p:style>
+                      <a:lnRef idx="2">
+                        <a:schemeClr val="accent1">
+                          <a:shade val="50000"/>
+                        </a:schemeClr>
+                      </a:lnRef>
+                      <a:fillRef idx="1">
+                        <a:schemeClr val="accent1"/>
+                      </a:fillRef>
+                      <a:effectRef idx="0">
+                        <a:schemeClr val="accent1"/>
+                      </a:effectRef>
+                      <a:fontRef idx="minor">
+                        <a:schemeClr val="lt1"/>
+                      </a:fontRef>
+                    </p:style>
+                    <p:txBody>
+                      <a:bodyPr rtlCol="0" anchor="ctr"/>
+                      <a:lstStyle/>
+                      <a:p>
+                        <a:pPr algn="ctr"/>
+                        <a:r>
+                          <a:rPr lang="en-US" sz="1400" dirty="0"/>
+                          <a:t>…</a:t>
+                        </a:r>
+                      </a:p>
+                    </p:txBody>
+                  </p:sp>
+                  <p:sp>
+                    <p:nvSpPr>
+                      <p:cNvPr id="57" name="Rectangle 56">
+                        <a:extLst>
+                          <a:ext uri="{FF2B5EF4-FFF2-40B4-BE49-F238E27FC236}">
+                            <a16:creationId xmlns:a16="http://schemas.microsoft.com/office/drawing/2014/main" id="{E0A9AA3A-F222-44ED-ABD1-39A99499C162}"/>
+                          </a:ext>
+                        </a:extLst>
+                      </p:cNvPr>
+                      <p:cNvSpPr/>
+                      <p:nvPr/>
+                    </p:nvSpPr>
+                    <p:spPr>
+                      <a:xfrm>
+                        <a:off x="1225763" y="3495829"/>
+                        <a:ext cx="1804089" cy="1656304"/>
+                      </a:xfrm>
+                      <a:prstGeom prst="rect">
+                        <a:avLst/>
+                      </a:prstGeom>
+                      <a:noFill/>
+                      <a:ln w="9525">
+                        <a:solidFill>
+                          <a:schemeClr val="tx2"/>
+                        </a:solidFill>
+                        <a:prstDash val="dash"/>
+                      </a:ln>
+                    </p:spPr>
+                    <p:style>
+                      <a:lnRef idx="2">
+                        <a:schemeClr val="accent1">
+                          <a:shade val="50000"/>
+                        </a:schemeClr>
+                      </a:lnRef>
+                      <a:fillRef idx="1">
+                        <a:schemeClr val="accent1"/>
+                      </a:fillRef>
+                      <a:effectRef idx="0">
+                        <a:schemeClr val="accent1"/>
+                      </a:effectRef>
+                      <a:fontRef idx="minor">
+                        <a:schemeClr val="lt1"/>
+                      </a:fontRef>
+                    </p:style>
+                    <p:txBody>
+                      <a:bodyPr rtlCol="0" anchor="ctr"/>
+                      <a:lstStyle/>
+                      <a:p>
+                        <a:pPr algn="ctr"/>
+                        <a:endParaRPr lang="en-US"/>
+                      </a:p>
+                    </p:txBody>
+                  </p:sp>
+                  <p:sp>
+                    <p:nvSpPr>
+                      <p:cNvPr id="58" name="ZoneTexte 57">
+                        <a:extLst>
+                          <a:ext uri="{FF2B5EF4-FFF2-40B4-BE49-F238E27FC236}">
+                            <a16:creationId xmlns:a16="http://schemas.microsoft.com/office/drawing/2014/main" id="{C53ACF25-7922-47DC-A0EF-FBEF3902B02D}"/>
+                          </a:ext>
+                        </a:extLst>
+                      </p:cNvPr>
+                      <p:cNvSpPr txBox="1"/>
+                      <p:nvPr/>
+                    </p:nvSpPr>
+                    <p:spPr>
+                      <a:xfrm>
+                        <a:off x="1374405" y="3576588"/>
+                        <a:ext cx="1514475" cy="215444"/>
+                      </a:xfrm>
+                      <a:prstGeom prst="rect">
+                        <a:avLst/>
+                      </a:prstGeom>
+                      <a:noFill/>
+                    </p:spPr>
+                    <p:txBody>
+                      <a:bodyPr vert="horz" wrap="square" lIns="0" tIns="0" rIns="0" bIns="0" numCol="1" spcCol="288000" rtlCol="0" anchor="t" anchorCtr="0">
+                        <a:spAutoFit/>
+                      </a:bodyPr>
+                      <a:lstStyle/>
+                      <a:p>
+                        <a:pPr algn="ctr">
+                          <a:spcBef>
+                            <a:spcPts val="0"/>
+                          </a:spcBef>
+                          <a:spcAft>
+                            <a:spcPts val="600"/>
+                          </a:spcAft>
+                        </a:pPr>
+                        <a:r>
+                          <a:rPr lang="en-US" sz="1400" b="0" i="0" spc="0" dirty="0">
+                            <a:ln>
+                              <a:noFill/>
+                            </a:ln>
+                            <a:solidFill>
+                              <a:schemeClr val="tx2"/>
+                            </a:solidFill>
+                            <a:latin typeface="Source Sans Pro Light" charset="0"/>
+                            <a:ea typeface="Source Sans Pro Light" charset="0"/>
+                            <a:cs typeface="Source Sans Pro Light" charset="0"/>
+                          </a:rPr>
+                          <a:t>EVENT handler</a:t>
+                        </a:r>
+                      </a:p>
+                    </p:txBody>
+                  </p:sp>
+                </p:grpSp>
                 <p:sp>
                   <p:nvSpPr>
-                    <p:cNvPr id="55" name="Rectangle 54">
+                    <p:cNvPr id="60" name="Rectangle 59">
                       <a:extLst>
                         <a:ext uri="{FF2B5EF4-FFF2-40B4-BE49-F238E27FC236}">
-                          <a16:creationId xmlns:a16="http://schemas.microsoft.com/office/drawing/2014/main" id="{89450EE5-46EA-491D-8853-1D4BBDFE78E7}"/>
+                          <a16:creationId xmlns:a16="http://schemas.microsoft.com/office/drawing/2014/main" id="{1E643E1F-529A-40CD-A59D-E2F1D3296805}"/>
                         </a:ext>
                       </a:extLst>
                     </p:cNvPr>
@@ -16946,7 +17177,7 @@
                   </p:nvSpPr>
                   <p:spPr>
                     <a:xfrm>
-                      <a:off x="1326095" y="3838110"/>
+                      <a:off x="1326095" y="4738767"/>
                       <a:ext cx="1611095" cy="358172"/>
                     </a:xfrm>
                     <a:prstGeom prst="rect">
@@ -16979,176 +17210,109 @@
                       <a:pPr algn="ctr"/>
                       <a:r>
                         <a:rPr lang="en-US" sz="1400" dirty="0"/>
-                        <a:t>Event Listener A</a:t>
+                        <a:t>Event </a:t>
                       </a:r>
-                    </a:p>
-                  </p:txBody>
-                </p:sp>
-                <p:sp>
-                  <p:nvSpPr>
-                    <p:cNvPr id="56" name="Rectangle 55">
-                      <a:extLst>
-                        <a:ext uri="{FF2B5EF4-FFF2-40B4-BE49-F238E27FC236}">
-                          <a16:creationId xmlns:a16="http://schemas.microsoft.com/office/drawing/2014/main" id="{BC8F0D09-9FE4-4F3D-9623-C86591172330}"/>
-                        </a:ext>
-                      </a:extLst>
-                    </p:cNvPr>
-                    <p:cNvSpPr/>
-                    <p:nvPr/>
-                  </p:nvSpPr>
-                  <p:spPr>
-                    <a:xfrm>
-                      <a:off x="1326095" y="4288438"/>
-                      <a:ext cx="1611095" cy="358172"/>
-                    </a:xfrm>
-                    <a:prstGeom prst="rect">
-                      <a:avLst/>
-                    </a:prstGeom>
-                    <a:ln>
-                      <a:noFill/>
-                    </a:ln>
-                  </p:spPr>
-                  <p:style>
-                    <a:lnRef idx="2">
-                      <a:schemeClr val="accent1">
-                        <a:shade val="50000"/>
-                      </a:schemeClr>
-                    </a:lnRef>
-                    <a:fillRef idx="1">
-                      <a:schemeClr val="accent1"/>
-                    </a:fillRef>
-                    <a:effectRef idx="0">
-                      <a:schemeClr val="accent1"/>
-                    </a:effectRef>
-                    <a:fontRef idx="minor">
-                      <a:schemeClr val="lt1"/>
-                    </a:fontRef>
-                  </p:style>
-                  <p:txBody>
-                    <a:bodyPr rtlCol="0" anchor="ctr"/>
-                    <a:lstStyle/>
-                    <a:p>
-                      <a:pPr algn="ctr"/>
                       <a:r>
-                        <a:rPr lang="en-US" sz="1400" dirty="0"/>
-                        <a:t>…</a:t>
+                        <a:rPr lang="en-US" sz="1400"/>
+                        <a:t>Listener Z</a:t>
                       </a:r>
-                    </a:p>
-                  </p:txBody>
-                </p:sp>
-                <p:sp>
-                  <p:nvSpPr>
-                    <p:cNvPr id="57" name="Rectangle 56">
-                      <a:extLst>
-                        <a:ext uri="{FF2B5EF4-FFF2-40B4-BE49-F238E27FC236}">
-                          <a16:creationId xmlns:a16="http://schemas.microsoft.com/office/drawing/2014/main" id="{E0A9AA3A-F222-44ED-ABD1-39A99499C162}"/>
-                        </a:ext>
-                      </a:extLst>
-                    </p:cNvPr>
-                    <p:cNvSpPr/>
-                    <p:nvPr/>
-                  </p:nvSpPr>
-                  <p:spPr>
-                    <a:xfrm>
-                      <a:off x="1225763" y="3495829"/>
-                      <a:ext cx="1804089" cy="1656304"/>
-                    </a:xfrm>
-                    <a:prstGeom prst="rect">
-                      <a:avLst/>
-                    </a:prstGeom>
-                    <a:noFill/>
-                    <a:ln w="9525">
-                      <a:solidFill>
-                        <a:schemeClr val="tx2"/>
-                      </a:solidFill>
-                      <a:prstDash val="dash"/>
-                    </a:ln>
-                  </p:spPr>
-                  <p:style>
-                    <a:lnRef idx="2">
-                      <a:schemeClr val="accent1">
-                        <a:shade val="50000"/>
-                      </a:schemeClr>
-                    </a:lnRef>
-                    <a:fillRef idx="1">
-                      <a:schemeClr val="accent1"/>
-                    </a:fillRef>
-                    <a:effectRef idx="0">
-                      <a:schemeClr val="accent1"/>
-                    </a:effectRef>
-                    <a:fontRef idx="minor">
-                      <a:schemeClr val="lt1"/>
-                    </a:fontRef>
-                  </p:style>
-                  <p:txBody>
-                    <a:bodyPr rtlCol="0" anchor="ctr"/>
-                    <a:lstStyle/>
-                    <a:p>
-                      <a:pPr algn="ctr"/>
-                      <a:endParaRPr lang="en-US"/>
-                    </a:p>
-                  </p:txBody>
-                </p:sp>
-                <p:sp>
-                  <p:nvSpPr>
-                    <p:cNvPr id="58" name="ZoneTexte 57">
-                      <a:extLst>
-                        <a:ext uri="{FF2B5EF4-FFF2-40B4-BE49-F238E27FC236}">
-                          <a16:creationId xmlns:a16="http://schemas.microsoft.com/office/drawing/2014/main" id="{C53ACF25-7922-47DC-A0EF-FBEF3902B02D}"/>
-                        </a:ext>
-                      </a:extLst>
-                    </p:cNvPr>
-                    <p:cNvSpPr txBox="1"/>
-                    <p:nvPr/>
-                  </p:nvSpPr>
-                  <p:spPr>
-                    <a:xfrm>
-                      <a:off x="1374405" y="3576588"/>
-                      <a:ext cx="1514475" cy="215444"/>
-                    </a:xfrm>
-                    <a:prstGeom prst="rect">
-                      <a:avLst/>
-                    </a:prstGeom>
-                    <a:noFill/>
-                  </p:spPr>
-                  <p:txBody>
-                    <a:bodyPr vert="horz" wrap="square" lIns="0" tIns="0" rIns="0" bIns="0" numCol="1" spcCol="288000" rtlCol="0" anchor="t" anchorCtr="0">
-                      <a:spAutoFit/>
-                    </a:bodyPr>
-                    <a:lstStyle/>
-                    <a:p>
-                      <a:pPr algn="ctr">
-                        <a:spcBef>
-                          <a:spcPts val="0"/>
-                        </a:spcBef>
-                        <a:spcAft>
-                          <a:spcPts val="600"/>
-                        </a:spcAft>
-                      </a:pPr>
-                      <a:r>
-                        <a:rPr lang="en-US" sz="1400" b="0" i="0" spc="0" dirty="0">
-                          <a:ln>
-                            <a:noFill/>
-                          </a:ln>
-                          <a:solidFill>
-                            <a:schemeClr val="tx2"/>
-                          </a:solidFill>
-                          <a:latin typeface="Source Sans Pro Light" charset="0"/>
-                          <a:ea typeface="Source Sans Pro Light" charset="0"/>
-                          <a:cs typeface="Source Sans Pro Light" charset="0"/>
-                        </a:rPr>
-                        <a:t>EVENT handler</a:t>
-                      </a:r>
+                      <a:endParaRPr lang="en-US" sz="1400" dirty="0"/>
                     </a:p>
                   </p:txBody>
                 </p:sp>
               </p:grpSp>
+              <p:cxnSp>
+                <p:nvCxnSpPr>
+                  <p:cNvPr id="67" name="Connecteur : en arc 66">
+                    <a:extLst>
+                      <a:ext uri="{FF2B5EF4-FFF2-40B4-BE49-F238E27FC236}">
+                        <a16:creationId xmlns:a16="http://schemas.microsoft.com/office/drawing/2014/main" id="{F40C9890-BA21-4E8D-972E-BF0067627BD6}"/>
+                      </a:ext>
+                    </a:extLst>
+                  </p:cNvPr>
+                  <p:cNvCxnSpPr>
+                    <a:stCxn id="57" idx="1"/>
+                    <a:endCxn id="2" idx="1"/>
+                  </p:cNvCxnSpPr>
+                  <p:nvPr/>
+                </p:nvCxnSpPr>
+                <p:spPr>
+                  <a:xfrm rot="10800000" flipH="1">
+                    <a:off x="3499822" y="3730311"/>
+                    <a:ext cx="219535" cy="1210400"/>
+                  </a:xfrm>
+                  <a:prstGeom prst="curvedConnector3">
+                    <a:avLst>
+                      <a:gd name="adj1" fmla="val -104129"/>
+                    </a:avLst>
+                  </a:prstGeom>
+                  <a:ln>
+                    <a:tailEnd type="triangle"/>
+                  </a:ln>
+                </p:spPr>
+                <p:style>
+                  <a:lnRef idx="1">
+                    <a:schemeClr val="accent1"/>
+                  </a:lnRef>
+                  <a:fillRef idx="0">
+                    <a:schemeClr val="accent1"/>
+                  </a:fillRef>
+                  <a:effectRef idx="0">
+                    <a:schemeClr val="accent1"/>
+                  </a:effectRef>
+                  <a:fontRef idx="minor">
+                    <a:schemeClr val="tx1"/>
+                  </a:fontRef>
+                </p:style>
+              </p:cxnSp>
+              <p:cxnSp>
+                <p:nvCxnSpPr>
+                  <p:cNvPr id="69" name="Connecteur droit avec flèche 68">
+                    <a:extLst>
+                      <a:ext uri="{FF2B5EF4-FFF2-40B4-BE49-F238E27FC236}">
+                        <a16:creationId xmlns:a16="http://schemas.microsoft.com/office/drawing/2014/main" id="{264F6576-3AEC-44AD-BF29-A6A0DCC9DF04}"/>
+                      </a:ext>
+                    </a:extLst>
+                  </p:cNvPr>
+                  <p:cNvCxnSpPr>
+                    <a:cxnSpLocks/>
+                    <a:stCxn id="15" idx="1"/>
+                  </p:cNvCxnSpPr>
+                  <p:nvPr/>
+                </p:nvCxnSpPr>
+                <p:spPr>
+                  <a:xfrm flipH="1">
+                    <a:off x="5371638" y="4940712"/>
+                    <a:ext cx="363324" cy="7613"/>
+                  </a:xfrm>
+                  <a:prstGeom prst="straightConnector1">
+                    <a:avLst/>
+                  </a:prstGeom>
+                  <a:ln>
+                    <a:tailEnd type="triangle"/>
+                  </a:ln>
+                </p:spPr>
+                <p:style>
+                  <a:lnRef idx="1">
+                    <a:schemeClr val="accent1"/>
+                  </a:lnRef>
+                  <a:fillRef idx="0">
+                    <a:schemeClr val="accent1"/>
+                  </a:fillRef>
+                  <a:effectRef idx="0">
+                    <a:schemeClr val="accent1"/>
+                  </a:effectRef>
+                  <a:fontRef idx="minor">
+                    <a:schemeClr val="tx1"/>
+                  </a:fontRef>
+                </p:style>
+              </p:cxnSp>
               <p:sp>
                 <p:nvSpPr>
-                  <p:cNvPr id="60" name="Rectangle 59">
+                  <p:cNvPr id="30" name="Rectangle: Rounded Corners 29">
                     <a:extLst>
                       <a:ext uri="{FF2B5EF4-FFF2-40B4-BE49-F238E27FC236}">
-                        <a16:creationId xmlns:a16="http://schemas.microsoft.com/office/drawing/2014/main" id="{1E643E1F-529A-40CD-A59D-E2F1D3296805}"/>
+                        <a16:creationId xmlns:a16="http://schemas.microsoft.com/office/drawing/2014/main" id="{F3C3D27F-7523-DF7C-7C5D-AA067785162B}"/>
                       </a:ext>
                     </a:extLst>
                   </p:cNvPr>
@@ -17157,12 +17321,15 @@
                 </p:nvSpPr>
                 <p:spPr>
                   <a:xfrm>
-                    <a:off x="1326095" y="4738767"/>
-                    <a:ext cx="1611095" cy="358172"/>
+                    <a:off x="2050150" y="2650765"/>
+                    <a:ext cx="877498" cy="3226507"/>
                   </a:xfrm>
-                  <a:prstGeom prst="rect">
+                  <a:prstGeom prst="roundRect">
                     <a:avLst/>
                   </a:prstGeom>
+                  <a:solidFill>
+                    <a:schemeClr val="accent4"/>
+                  </a:solidFill>
                   <a:ln>
                     <a:noFill/>
                   </a:ln>
@@ -17189,390 +17356,456 @@
                   <a:p>
                     <a:pPr algn="ctr"/>
                     <a:r>
-                      <a:rPr lang="en-US" sz="1400" dirty="0"/>
-                      <a:t>Event </a:t>
+                      <a:rPr lang="fr-FR" sz="1600" dirty="0"/>
+                      <a:t>App Thread N</a:t>
                     </a:r>
-                    <a:r>
-                      <a:rPr lang="en-US" sz="1400"/>
-                      <a:t>Listener Z</a:t>
-                    </a:r>
-                    <a:endParaRPr lang="en-US" sz="1400" dirty="0"/>
+                    <a:endParaRPr lang="en-GB" sz="1600" dirty="0"/>
                   </a:p>
                 </p:txBody>
               </p:sp>
-            </p:grpSp>
-            <p:cxnSp>
-              <p:nvCxnSpPr>
-                <p:cNvPr id="67" name="Connecteur : en arc 66">
-                  <a:extLst>
-                    <a:ext uri="{FF2B5EF4-FFF2-40B4-BE49-F238E27FC236}">
-                      <a16:creationId xmlns:a16="http://schemas.microsoft.com/office/drawing/2014/main" id="{F40C9890-BA21-4E8D-972E-BF0067627BD6}"/>
-                    </a:ext>
-                  </a:extLst>
-                </p:cNvPr>
-                <p:cNvCxnSpPr>
-                  <a:stCxn id="57" idx="1"/>
-                  <a:endCxn id="2" idx="1"/>
-                </p:cNvCxnSpPr>
-                <p:nvPr/>
-              </p:nvCxnSpPr>
-              <p:spPr>
-                <a:xfrm rot="10800000" flipH="1">
-                  <a:off x="3499822" y="3730311"/>
-                  <a:ext cx="219535" cy="1210400"/>
-                </a:xfrm>
-                <a:prstGeom prst="curvedConnector3">
-                  <a:avLst>
-                    <a:gd name="adj1" fmla="val -104129"/>
-                  </a:avLst>
-                </a:prstGeom>
-                <a:ln>
-                  <a:tailEnd type="triangle"/>
-                </a:ln>
-              </p:spPr>
-              <p:style>
-                <a:lnRef idx="1">
-                  <a:schemeClr val="accent1"/>
-                </a:lnRef>
-                <a:fillRef idx="0">
-                  <a:schemeClr val="accent1"/>
-                </a:fillRef>
-                <a:effectRef idx="0">
-                  <a:schemeClr val="accent1"/>
-                </a:effectRef>
-                <a:fontRef idx="minor">
-                  <a:schemeClr val="tx1"/>
-                </a:fontRef>
-              </p:style>
-            </p:cxnSp>
-            <p:cxnSp>
-              <p:nvCxnSpPr>
-                <p:cNvPr id="69" name="Connecteur droit avec flèche 68">
-                  <a:extLst>
-                    <a:ext uri="{FF2B5EF4-FFF2-40B4-BE49-F238E27FC236}">
-                      <a16:creationId xmlns:a16="http://schemas.microsoft.com/office/drawing/2014/main" id="{264F6576-3AEC-44AD-BF29-A6A0DCC9DF04}"/>
-                    </a:ext>
-                  </a:extLst>
-                </p:cNvPr>
-                <p:cNvCxnSpPr>
-                  <a:cxnSpLocks/>
-                  <a:stCxn id="15" idx="1"/>
-                </p:cNvCxnSpPr>
-                <p:nvPr/>
-              </p:nvCxnSpPr>
-              <p:spPr>
-                <a:xfrm flipH="1">
-                  <a:off x="5371638" y="4940712"/>
-                  <a:ext cx="363324" cy="7613"/>
-                </a:xfrm>
-                <a:prstGeom prst="straightConnector1">
-                  <a:avLst/>
-                </a:prstGeom>
-                <a:ln>
-                  <a:tailEnd type="triangle"/>
-                </a:ln>
-              </p:spPr>
-              <p:style>
-                <a:lnRef idx="1">
-                  <a:schemeClr val="accent1"/>
-                </a:lnRef>
-                <a:fillRef idx="0">
-                  <a:schemeClr val="accent1"/>
-                </a:fillRef>
-                <a:effectRef idx="0">
-                  <a:schemeClr val="accent1"/>
-                </a:effectRef>
-                <a:fontRef idx="minor">
-                  <a:schemeClr val="tx1"/>
-                </a:fontRef>
-              </p:style>
-            </p:cxnSp>
-            <p:sp>
-              <p:nvSpPr>
-                <p:cNvPr id="30" name="Rectangle: Rounded Corners 29">
-                  <a:extLst>
-                    <a:ext uri="{FF2B5EF4-FFF2-40B4-BE49-F238E27FC236}">
-                      <a16:creationId xmlns:a16="http://schemas.microsoft.com/office/drawing/2014/main" id="{F3C3D27F-7523-DF7C-7C5D-AA067785162B}"/>
-                    </a:ext>
-                  </a:extLst>
-                </p:cNvPr>
-                <p:cNvSpPr/>
-                <p:nvPr/>
-              </p:nvSpPr>
-              <p:spPr>
-                <a:xfrm>
-                  <a:off x="2050150" y="2650765"/>
-                  <a:ext cx="877498" cy="3226507"/>
-                </a:xfrm>
-                <a:prstGeom prst="roundRect">
-                  <a:avLst/>
-                </a:prstGeom>
-                <a:solidFill>
-                  <a:schemeClr val="accent4"/>
-                </a:solidFill>
-                <a:ln>
+              <p:sp>
+                <p:nvSpPr>
+                  <p:cNvPr id="31" name="Rectangle: Rounded Corners 30">
+                    <a:extLst>
+                      <a:ext uri="{FF2B5EF4-FFF2-40B4-BE49-F238E27FC236}">
+                        <a16:creationId xmlns:a16="http://schemas.microsoft.com/office/drawing/2014/main" id="{9AC038AD-4CC1-1B3D-3939-0D6FF46078DC}"/>
+                      </a:ext>
+                    </a:extLst>
+                  </p:cNvPr>
+                  <p:cNvSpPr/>
+                  <p:nvPr/>
+                </p:nvSpPr>
+                <p:spPr>
+                  <a:xfrm>
+                    <a:off x="681998" y="2650765"/>
+                    <a:ext cx="877498" cy="3226507"/>
+                  </a:xfrm>
+                  <a:prstGeom prst="roundRect">
+                    <a:avLst/>
+                  </a:prstGeom>
+                  <a:solidFill>
+                    <a:schemeClr val="accent4"/>
+                  </a:solidFill>
+                  <a:ln>
+                    <a:noFill/>
+                  </a:ln>
+                </p:spPr>
+                <p:style>
+                  <a:lnRef idx="2">
+                    <a:schemeClr val="accent1">
+                      <a:shade val="50000"/>
+                    </a:schemeClr>
+                  </a:lnRef>
+                  <a:fillRef idx="1">
+                    <a:schemeClr val="accent1"/>
+                  </a:fillRef>
+                  <a:effectRef idx="0">
+                    <a:schemeClr val="accent1"/>
+                  </a:effectRef>
+                  <a:fontRef idx="minor">
+                    <a:schemeClr val="lt1"/>
+                  </a:fontRef>
+                </p:style>
+                <p:txBody>
+                  <a:bodyPr rtlCol="0" anchor="ctr"/>
+                  <a:lstStyle/>
+                  <a:p>
+                    <a:pPr algn="ctr"/>
+                    <a:r>
+                      <a:rPr lang="fr-FR" sz="1600" dirty="0"/>
+                      <a:t>App Thread 1</a:t>
+                    </a:r>
+                    <a:endParaRPr lang="en-GB" sz="1600" dirty="0"/>
+                  </a:p>
+                </p:txBody>
+              </p:sp>
+              <p:sp>
+                <p:nvSpPr>
+                  <p:cNvPr id="32" name="TextBox 31">
+                    <a:extLst>
+                      <a:ext uri="{FF2B5EF4-FFF2-40B4-BE49-F238E27FC236}">
+                        <a16:creationId xmlns:a16="http://schemas.microsoft.com/office/drawing/2014/main" id="{424F9032-B76D-6792-F697-15CE5C898932}"/>
+                      </a:ext>
+                    </a:extLst>
+                  </p:cNvPr>
+                  <p:cNvSpPr txBox="1"/>
+                  <p:nvPr/>
+                </p:nvSpPr>
+                <p:spPr>
+                  <a:xfrm>
+                    <a:off x="1680816" y="4326192"/>
+                    <a:ext cx="166712" cy="215444"/>
+                  </a:xfrm>
+                  <a:prstGeom prst="rect">
+                    <a:avLst/>
+                  </a:prstGeom>
                   <a:noFill/>
-                </a:ln>
-              </p:spPr>
-              <p:style>
-                <a:lnRef idx="2">
-                  <a:schemeClr val="accent1">
-                    <a:shade val="50000"/>
-                  </a:schemeClr>
-                </a:lnRef>
-                <a:fillRef idx="1">
-                  <a:schemeClr val="accent1"/>
-                </a:fillRef>
-                <a:effectRef idx="0">
-                  <a:schemeClr val="accent1"/>
-                </a:effectRef>
-                <a:fontRef idx="minor">
-                  <a:schemeClr val="lt1"/>
-                </a:fontRef>
-              </p:style>
-              <p:txBody>
-                <a:bodyPr rtlCol="0" anchor="ctr"/>
-                <a:lstStyle/>
-                <a:p>
-                  <a:pPr algn="ctr"/>
-                  <a:r>
-                    <a:rPr lang="fr-FR" sz="1600" dirty="0"/>
-                    <a:t>App Thread N</a:t>
-                  </a:r>
-                  <a:endParaRPr lang="en-GB" sz="1600" dirty="0"/>
-                </a:p>
-              </p:txBody>
-            </p:sp>
-            <p:sp>
-              <p:nvSpPr>
-                <p:cNvPr id="31" name="Rectangle: Rounded Corners 30">
-                  <a:extLst>
-                    <a:ext uri="{FF2B5EF4-FFF2-40B4-BE49-F238E27FC236}">
-                      <a16:creationId xmlns:a16="http://schemas.microsoft.com/office/drawing/2014/main" id="{9AC038AD-4CC1-1B3D-3939-0D6FF46078DC}"/>
-                    </a:ext>
-                  </a:extLst>
-                </p:cNvPr>
-                <p:cNvSpPr/>
-                <p:nvPr/>
-              </p:nvSpPr>
-              <p:spPr>
-                <a:xfrm>
-                  <a:off x="681998" y="2650765"/>
-                  <a:ext cx="877498" cy="3226507"/>
-                </a:xfrm>
-                <a:prstGeom prst="roundRect">
-                  <a:avLst/>
-                </a:prstGeom>
-                <a:solidFill>
-                  <a:schemeClr val="accent4"/>
-                </a:solidFill>
-                <a:ln>
-                  <a:noFill/>
-                </a:ln>
-              </p:spPr>
-              <p:style>
-                <a:lnRef idx="2">
-                  <a:schemeClr val="accent1">
-                    <a:shade val="50000"/>
-                  </a:schemeClr>
-                </a:lnRef>
-                <a:fillRef idx="1">
-                  <a:schemeClr val="accent1"/>
-                </a:fillRef>
-                <a:effectRef idx="0">
-                  <a:schemeClr val="accent1"/>
-                </a:effectRef>
-                <a:fontRef idx="minor">
-                  <a:schemeClr val="lt1"/>
-                </a:fontRef>
-              </p:style>
-              <p:txBody>
-                <a:bodyPr rtlCol="0" anchor="ctr"/>
-                <a:lstStyle/>
-                <a:p>
-                  <a:pPr algn="ctr"/>
-                  <a:r>
-                    <a:rPr lang="fr-FR" sz="1600" dirty="0"/>
-                    <a:t>App Thread 1</a:t>
-                  </a:r>
-                  <a:endParaRPr lang="en-GB" sz="1600" dirty="0"/>
-                </a:p>
-              </p:txBody>
-            </p:sp>
-            <p:sp>
-              <p:nvSpPr>
-                <p:cNvPr id="32" name="TextBox 31">
-                  <a:extLst>
-                    <a:ext uri="{FF2B5EF4-FFF2-40B4-BE49-F238E27FC236}">
-                      <a16:creationId xmlns:a16="http://schemas.microsoft.com/office/drawing/2014/main" id="{424F9032-B76D-6792-F697-15CE5C898932}"/>
-                    </a:ext>
-                  </a:extLst>
-                </p:cNvPr>
-                <p:cNvSpPr txBox="1"/>
-                <p:nvPr/>
-              </p:nvSpPr>
-              <p:spPr>
-                <a:xfrm>
-                  <a:off x="1680816" y="4326192"/>
-                  <a:ext cx="166712" cy="215444"/>
-                </a:xfrm>
-                <a:prstGeom prst="rect">
-                  <a:avLst/>
-                </a:prstGeom>
-                <a:noFill/>
-              </p:spPr>
-              <p:txBody>
-                <a:bodyPr vert="horz" wrap="none" lIns="0" tIns="0" rIns="0" bIns="0" numCol="1" spcCol="288000" rtlCol="0" anchor="t" anchorCtr="0">
-                  <a:spAutoFit/>
-                </a:bodyPr>
-                <a:lstStyle/>
-                <a:p>
-                  <a:pPr algn="l">
-                    <a:spcBef>
-                      <a:spcPts val="0"/>
-                    </a:spcBef>
-                    <a:spcAft>
-                      <a:spcPts val="600"/>
-                    </a:spcAft>
-                  </a:pPr>
-                  <a:r>
-                    <a:rPr lang="fr-FR" sz="1400" b="0" i="0" spc="0" dirty="0">
+                </p:spPr>
+                <p:txBody>
+                  <a:bodyPr vert="horz" wrap="none" lIns="0" tIns="0" rIns="0" bIns="0" numCol="1" spcCol="288000" rtlCol="0" anchor="t" anchorCtr="0">
+                    <a:spAutoFit/>
+                  </a:bodyPr>
+                  <a:lstStyle/>
+                  <a:p>
+                    <a:pPr algn="l">
+                      <a:spcBef>
+                        <a:spcPts val="0"/>
+                      </a:spcBef>
+                      <a:spcAft>
+                        <a:spcPts val="600"/>
+                      </a:spcAft>
+                    </a:pPr>
+                    <a:r>
+                      <a:rPr lang="fr-FR" sz="1400" b="0" i="0" spc="0" dirty="0">
+                        <a:ln>
+                          <a:noFill/>
+                        </a:ln>
+                        <a:latin typeface="Source Sans Pro Light" charset="0"/>
+                        <a:ea typeface="Source Sans Pro Light" charset="0"/>
+                        <a:cs typeface="Source Sans Pro Light" charset="0"/>
+                      </a:rPr>
+                      <a:t>…</a:t>
+                    </a:r>
+                    <a:endParaRPr lang="en-GB" sz="1400" b="0" i="0" spc="0" dirty="0">
                       <a:ln>
                         <a:noFill/>
                       </a:ln>
                       <a:latin typeface="Source Sans Pro Light" charset="0"/>
                       <a:ea typeface="Source Sans Pro Light" charset="0"/>
                       <a:cs typeface="Source Sans Pro Light" charset="0"/>
-                    </a:rPr>
-                    <a:t>…</a:t>
-                  </a:r>
-                  <a:endParaRPr lang="en-GB" sz="1400" b="0" i="0" spc="0" dirty="0">
+                    </a:endParaRPr>
+                  </a:p>
+                </p:txBody>
+              </p:sp>
+              <p:sp>
+                <p:nvSpPr>
+                  <p:cNvPr id="36" name="TextBox 35">
+                    <a:extLst>
+                      <a:ext uri="{FF2B5EF4-FFF2-40B4-BE49-F238E27FC236}">
+                        <a16:creationId xmlns:a16="http://schemas.microsoft.com/office/drawing/2014/main" id="{CFA3FEFE-1DB9-AB25-F9C6-4882C1CAB91D}"/>
+                      </a:ext>
+                    </a:extLst>
+                  </p:cNvPr>
+                  <p:cNvSpPr txBox="1"/>
+                  <p:nvPr/>
+                </p:nvSpPr>
+                <p:spPr>
+                  <a:xfrm>
+                    <a:off x="2660648" y="1744053"/>
+                    <a:ext cx="1678345" cy="276999"/>
+                  </a:xfrm>
+                  <a:prstGeom prst="rect">
+                    <a:avLst/>
+                  </a:prstGeom>
+                  <a:noFill/>
+                </p:spPr>
+                <p:txBody>
+                  <a:bodyPr vert="horz" wrap="none" lIns="0" tIns="0" rIns="0" bIns="0" numCol="1" spcCol="288000" rtlCol="0" anchor="t" anchorCtr="0">
+                    <a:spAutoFit/>
+                  </a:bodyPr>
+                  <a:lstStyle/>
+                  <a:p>
+                    <a:pPr algn="l">
+                      <a:spcBef>
+                        <a:spcPts val="0"/>
+                      </a:spcBef>
+                      <a:spcAft>
+                        <a:spcPts val="600"/>
+                      </a:spcAft>
+                    </a:pPr>
+                    <a:r>
+                      <a:rPr lang="fr-FR" i="0" spc="0" dirty="0">
+                        <a:ln>
+                          <a:noFill/>
+                        </a:ln>
+                        <a:latin typeface="Source Sans Pro Light" charset="0"/>
+                        <a:ea typeface="Source Sans Pro Light" charset="0"/>
+                        <a:cs typeface="Source Sans Pro Light" charset="0"/>
+                      </a:rPr>
+                      <a:t>Application (Java)</a:t>
+                    </a:r>
+                    <a:endParaRPr lang="en-GB" i="0" spc="0" dirty="0">
+                      <a:ln>
+                        <a:noFill/>
+                      </a:ln>
+                      <a:latin typeface="Source Sans Pro Light" charset="0"/>
+                      <a:ea typeface="Source Sans Pro Light" charset="0"/>
+                      <a:cs typeface="Source Sans Pro Light" charset="0"/>
+                    </a:endParaRPr>
+                  </a:p>
+                </p:txBody>
+              </p:sp>
+              <p:sp>
+                <p:nvSpPr>
+                  <p:cNvPr id="38" name="TextBox 37">
+                    <a:extLst>
+                      <a:ext uri="{FF2B5EF4-FFF2-40B4-BE49-F238E27FC236}">
+                        <a16:creationId xmlns:a16="http://schemas.microsoft.com/office/drawing/2014/main" id="{3053BC60-B678-F872-D6D7-AF9EF8B85FFC}"/>
+                      </a:ext>
+                    </a:extLst>
+                  </p:cNvPr>
+                  <p:cNvSpPr txBox="1"/>
+                  <p:nvPr/>
+                </p:nvSpPr>
+                <p:spPr>
+                  <a:xfrm>
+                    <a:off x="9406946" y="1744053"/>
+                    <a:ext cx="902491" cy="276999"/>
+                  </a:xfrm>
+                  <a:prstGeom prst="rect">
+                    <a:avLst/>
+                  </a:prstGeom>
+                  <a:noFill/>
+                </p:spPr>
+                <p:txBody>
+                  <a:bodyPr vert="horz" wrap="none" lIns="0" tIns="0" rIns="0" bIns="0" numCol="1" spcCol="288000" rtlCol="0" anchor="t" anchorCtr="0">
+                    <a:spAutoFit/>
+                  </a:bodyPr>
+                  <a:lstStyle/>
+                  <a:p>
+                    <a:pPr algn="l">
+                      <a:spcBef>
+                        <a:spcPts val="0"/>
+                      </a:spcBef>
+                      <a:spcAft>
+                        <a:spcPts val="600"/>
+                      </a:spcAft>
+                    </a:pPr>
+                    <a:r>
+                      <a:rPr lang="fr-FR" i="0" spc="0" dirty="0">
+                        <a:ln>
+                          <a:noFill/>
+                        </a:ln>
+                        <a:latin typeface="Source Sans Pro Light" charset="0"/>
+                        <a:ea typeface="Source Sans Pro Light" charset="0"/>
+                        <a:cs typeface="Source Sans Pro Light" charset="0"/>
+                      </a:rPr>
+                      <a:t>Native (C)</a:t>
+                    </a:r>
+                  </a:p>
+                </p:txBody>
+              </p:sp>
+            </p:grpSp>
+          </p:grpSp>
+          <p:sp>
+            <p:nvSpPr>
+              <p:cNvPr id="7" name="Rectangle: Rounded Corners 6">
+                <a:extLst>
+                  <a:ext uri="{FF2B5EF4-FFF2-40B4-BE49-F238E27FC236}">
+                    <a16:creationId xmlns:a16="http://schemas.microsoft.com/office/drawing/2014/main" id="{141630B8-1075-4109-E7DF-26446364367C}"/>
+                  </a:ext>
+                </a:extLst>
+              </p:cNvPr>
+              <p:cNvSpPr/>
+              <p:nvPr/>
+            </p:nvSpPr>
+            <p:spPr>
+              <a:xfrm>
+                <a:off x="8820215" y="2144806"/>
+                <a:ext cx="877498" cy="4414093"/>
+              </a:xfrm>
+              <a:prstGeom prst="roundRect">
+                <a:avLst/>
+              </a:prstGeom>
+              <a:solidFill>
+                <a:schemeClr val="bg1"/>
+              </a:solidFill>
+              <a:ln w="57150">
+                <a:solidFill>
+                  <a:schemeClr val="tx2"/>
+                </a:solidFill>
+              </a:ln>
+            </p:spPr>
+            <p:style>
+              <a:lnRef idx="0">
+                <a:scrgbClr r="0" g="0" b="0"/>
+              </a:lnRef>
+              <a:fillRef idx="0">
+                <a:scrgbClr r="0" g="0" b="0"/>
+              </a:fillRef>
+              <a:effectRef idx="0">
+                <a:scrgbClr r="0" g="0" b="0"/>
+              </a:effectRef>
+              <a:fontRef idx="minor">
+                <a:schemeClr val="lt1"/>
+              </a:fontRef>
+            </p:style>
+            <p:txBody>
+              <a:bodyPr rtlCol="0" anchor="ctr"/>
+              <a:lstStyle/>
+              <a:p>
+                <a:pPr algn="ctr"/>
+                <a:r>
+                  <a:rPr lang="fr-FR" sz="1600" dirty="0">
+                    <a:solidFill>
+                      <a:schemeClr val="tx2"/>
+                    </a:solidFill>
+                  </a:rPr>
+                  <a:t>RTOS Thread 2</a:t>
+                </a:r>
+                <a:endParaRPr lang="en-GB" sz="1600" dirty="0">
+                  <a:solidFill>
+                    <a:schemeClr val="tx2"/>
+                  </a:solidFill>
+                </a:endParaRPr>
+              </a:p>
+            </p:txBody>
+          </p:sp>
+          <p:sp>
+            <p:nvSpPr>
+              <p:cNvPr id="8" name="Rectangle: Rounded Corners 7">
+                <a:extLst>
+                  <a:ext uri="{FF2B5EF4-FFF2-40B4-BE49-F238E27FC236}">
+                    <a16:creationId xmlns:a16="http://schemas.microsoft.com/office/drawing/2014/main" id="{4ABD14D6-2C73-28D7-A08E-2F5DF64EFD06}"/>
+                  </a:ext>
+                </a:extLst>
+              </p:cNvPr>
+              <p:cNvSpPr/>
+              <p:nvPr/>
+            </p:nvSpPr>
+            <p:spPr>
+              <a:xfrm>
+                <a:off x="10189542" y="2144807"/>
+                <a:ext cx="877498" cy="4414092"/>
+              </a:xfrm>
+              <a:prstGeom prst="roundRect">
+                <a:avLst/>
+              </a:prstGeom>
+              <a:solidFill>
+                <a:schemeClr val="bg1"/>
+              </a:solidFill>
+              <a:ln w="57150">
+                <a:solidFill>
+                  <a:schemeClr val="tx2"/>
+                </a:solidFill>
+              </a:ln>
+            </p:spPr>
+            <p:style>
+              <a:lnRef idx="0">
+                <a:scrgbClr r="0" g="0" b="0"/>
+              </a:lnRef>
+              <a:fillRef idx="0">
+                <a:scrgbClr r="0" g="0" b="0"/>
+              </a:fillRef>
+              <a:effectRef idx="0">
+                <a:scrgbClr r="0" g="0" b="0"/>
+              </a:effectRef>
+              <a:fontRef idx="minor">
+                <a:schemeClr val="lt1"/>
+              </a:fontRef>
+            </p:style>
+            <p:txBody>
+              <a:bodyPr rtlCol="0" anchor="ctr"/>
+              <a:lstStyle/>
+              <a:p>
+                <a:pPr algn="ctr"/>
+                <a:r>
+                  <a:rPr lang="fr-FR" sz="1600" dirty="0">
+                    <a:solidFill>
+                      <a:schemeClr val="tx2"/>
+                    </a:solidFill>
+                  </a:rPr>
+                  <a:t>RTOS Thread N</a:t>
+                </a:r>
+                <a:endParaRPr lang="en-GB" sz="1600" dirty="0">
+                  <a:solidFill>
+                    <a:schemeClr val="tx2"/>
+                  </a:solidFill>
+                </a:endParaRPr>
+              </a:p>
+            </p:txBody>
+          </p:sp>
+          <p:sp>
+            <p:nvSpPr>
+              <p:cNvPr id="10" name="TextBox 9">
+                <a:extLst>
+                  <a:ext uri="{FF2B5EF4-FFF2-40B4-BE49-F238E27FC236}">
+                    <a16:creationId xmlns:a16="http://schemas.microsoft.com/office/drawing/2014/main" id="{395627A6-2D14-F0A8-C513-41CCF9CEB9FE}"/>
+                  </a:ext>
+                </a:extLst>
+              </p:cNvPr>
+              <p:cNvSpPr txBox="1"/>
+              <p:nvPr/>
+            </p:nvSpPr>
+            <p:spPr>
+              <a:xfrm>
+                <a:off x="9773144" y="4356857"/>
+                <a:ext cx="404988" cy="307777"/>
+              </a:xfrm>
+              <a:prstGeom prst="rect">
+                <a:avLst/>
+              </a:prstGeom>
+              <a:noFill/>
+            </p:spPr>
+            <p:txBody>
+              <a:bodyPr wrap="square">
+                <a:spAutoFit/>
+              </a:bodyPr>
+              <a:lstStyle/>
+              <a:p>
+                <a:r>
+                  <a:rPr lang="fr-FR" sz="1400" b="0" i="0" spc="0" dirty="0">
                     <a:ln>
                       <a:noFill/>
                     </a:ln>
                     <a:latin typeface="Source Sans Pro Light" charset="0"/>
                     <a:ea typeface="Source Sans Pro Light" charset="0"/>
                     <a:cs typeface="Source Sans Pro Light" charset="0"/>
-                  </a:endParaRPr>
-                </a:p>
-              </p:txBody>
-            </p:sp>
-            <p:sp>
-              <p:nvSpPr>
-                <p:cNvPr id="36" name="TextBox 35">
-                  <a:extLst>
-                    <a:ext uri="{FF2B5EF4-FFF2-40B4-BE49-F238E27FC236}">
-                      <a16:creationId xmlns:a16="http://schemas.microsoft.com/office/drawing/2014/main" id="{CFA3FEFE-1DB9-AB25-F9C6-4882C1CAB91D}"/>
-                    </a:ext>
-                  </a:extLst>
-                </p:cNvPr>
-                <p:cNvSpPr txBox="1"/>
-                <p:nvPr/>
-              </p:nvSpPr>
-              <p:spPr>
-                <a:xfrm>
-                  <a:off x="2660648" y="1744053"/>
-                  <a:ext cx="1678345" cy="276999"/>
-                </a:xfrm>
-                <a:prstGeom prst="rect">
-                  <a:avLst/>
-                </a:prstGeom>
-                <a:noFill/>
-              </p:spPr>
-              <p:txBody>
-                <a:bodyPr vert="horz" wrap="none" lIns="0" tIns="0" rIns="0" bIns="0" numCol="1" spcCol="288000" rtlCol="0" anchor="t" anchorCtr="0">
-                  <a:spAutoFit/>
-                </a:bodyPr>
-                <a:lstStyle/>
-                <a:p>
-                  <a:pPr algn="l">
-                    <a:spcBef>
-                      <a:spcPts val="0"/>
-                    </a:spcBef>
-                    <a:spcAft>
-                      <a:spcPts val="600"/>
-                    </a:spcAft>
-                  </a:pPr>
-                  <a:r>
-                    <a:rPr lang="fr-FR" i="0" spc="0" dirty="0">
-                      <a:ln>
-                        <a:noFill/>
-                      </a:ln>
-                      <a:latin typeface="Source Sans Pro Light" charset="0"/>
-                      <a:ea typeface="Source Sans Pro Light" charset="0"/>
-                      <a:cs typeface="Source Sans Pro Light" charset="0"/>
-                    </a:rPr>
-                    <a:t>Application (Java)</a:t>
-                  </a:r>
-                  <a:endParaRPr lang="en-GB" i="0" spc="0" dirty="0">
-                    <a:ln>
-                      <a:noFill/>
-                    </a:ln>
-                    <a:latin typeface="Source Sans Pro Light" charset="0"/>
-                    <a:ea typeface="Source Sans Pro Light" charset="0"/>
-                    <a:cs typeface="Source Sans Pro Light" charset="0"/>
-                  </a:endParaRPr>
-                </a:p>
-              </p:txBody>
-            </p:sp>
-            <p:sp>
-              <p:nvSpPr>
-                <p:cNvPr id="38" name="TextBox 37">
-                  <a:extLst>
-                    <a:ext uri="{FF2B5EF4-FFF2-40B4-BE49-F238E27FC236}">
-                      <a16:creationId xmlns:a16="http://schemas.microsoft.com/office/drawing/2014/main" id="{3053BC60-B678-F872-D6D7-AF9EF8B85FFC}"/>
-                    </a:ext>
-                  </a:extLst>
-                </p:cNvPr>
-                <p:cNvSpPr txBox="1"/>
-                <p:nvPr/>
-              </p:nvSpPr>
-              <p:spPr>
-                <a:xfrm>
-                  <a:off x="9406946" y="1744053"/>
-                  <a:ext cx="902491" cy="276999"/>
-                </a:xfrm>
-                <a:prstGeom prst="rect">
-                  <a:avLst/>
-                </a:prstGeom>
-                <a:noFill/>
-              </p:spPr>
-              <p:txBody>
-                <a:bodyPr vert="horz" wrap="none" lIns="0" tIns="0" rIns="0" bIns="0" numCol="1" spcCol="288000" rtlCol="0" anchor="t" anchorCtr="0">
-                  <a:spAutoFit/>
-                </a:bodyPr>
-                <a:lstStyle/>
-                <a:p>
-                  <a:pPr algn="l">
-                    <a:spcBef>
-                      <a:spcPts val="0"/>
-                    </a:spcBef>
-                    <a:spcAft>
-                      <a:spcPts val="600"/>
-                    </a:spcAft>
-                  </a:pPr>
-                  <a:r>
-                    <a:rPr lang="fr-FR" i="0" spc="0" dirty="0">
-                      <a:ln>
-                        <a:noFill/>
-                      </a:ln>
-                      <a:latin typeface="Source Sans Pro Light" charset="0"/>
-                      <a:ea typeface="Source Sans Pro Light" charset="0"/>
-                      <a:cs typeface="Source Sans Pro Light" charset="0"/>
-                    </a:rPr>
-                    <a:t>Native (C)</a:t>
-                  </a:r>
-                </a:p>
-              </p:txBody>
-            </p:sp>
-          </p:grpSp>
+                  </a:rPr>
+                  <a:t>…</a:t>
+                </a:r>
+                <a:endParaRPr lang="en-US" sz="1400" dirty="0"/>
+              </a:p>
+            </p:txBody>
+          </p:sp>
+          <p:cxnSp>
+            <p:nvCxnSpPr>
+              <p:cNvPr id="11" name="Connecteur droit avec flèche 16">
+                <a:extLst>
+                  <a:ext uri="{FF2B5EF4-FFF2-40B4-BE49-F238E27FC236}">
+                    <a16:creationId xmlns:a16="http://schemas.microsoft.com/office/drawing/2014/main" id="{1385CF0A-A889-96E8-0B5E-903F1231B959}"/>
+                  </a:ext>
+                </a:extLst>
+              </p:cNvPr>
+              <p:cNvCxnSpPr>
+                <a:cxnSpLocks/>
+              </p:cNvCxnSpPr>
+              <p:nvPr/>
+            </p:nvCxnSpPr>
+            <p:spPr>
+              <a:xfrm flipH="1">
+                <a:off x="8222876" y="5001797"/>
+                <a:ext cx="786493" cy="0"/>
+              </a:xfrm>
+              <a:prstGeom prst="straightConnector1">
+                <a:avLst/>
+              </a:prstGeom>
+              <a:ln>
+                <a:tailEnd type="triangle"/>
+              </a:ln>
+            </p:spPr>
+            <p:style>
+              <a:lnRef idx="1">
+                <a:schemeClr val="accent1"/>
+              </a:lnRef>
+              <a:fillRef idx="0">
+                <a:schemeClr val="accent1"/>
+              </a:fillRef>
+              <a:effectRef idx="0">
+                <a:schemeClr val="accent1"/>
+              </a:effectRef>
+              <a:fontRef idx="minor">
+                <a:schemeClr val="tx1"/>
+              </a:fontRef>
+            </p:style>
+          </p:cxnSp>
         </p:grpSp>
         <p:sp>
           <p:nvSpPr>
-            <p:cNvPr id="7" name="Rectangle: Rounded Corners 6">
+            <p:cNvPr id="6" name="Rectangle: Rounded Corners 5">
               <a:extLst>
                 <a:ext uri="{FF2B5EF4-FFF2-40B4-BE49-F238E27FC236}">
-                  <a16:creationId xmlns:a16="http://schemas.microsoft.com/office/drawing/2014/main" id="{141630B8-1075-4109-E7DF-26446364367C}"/>
+                  <a16:creationId xmlns:a16="http://schemas.microsoft.com/office/drawing/2014/main" id="{C5724F72-80A0-8DD0-E7C9-89A3E9FF570F}"/>
                 </a:ext>
               </a:extLst>
             </p:cNvPr>
@@ -17581,8 +17814,8 @@
           </p:nvSpPr>
           <p:spPr>
             <a:xfrm>
-              <a:off x="8820215" y="2144806"/>
-              <a:ext cx="877498" cy="4414093"/>
+              <a:off x="8894174" y="5376466"/>
+              <a:ext cx="2246825" cy="548413"/>
             </a:xfrm>
             <a:prstGeom prst="roundRect">
               <a:avLst/>
@@ -17616,148 +17849,50 @@
             <a:p>
               <a:pPr algn="ctr"/>
               <a:r>
-                <a:rPr lang="fr-FR" sz="1600" dirty="0">
+                <a:rPr lang="fr-FR" sz="1600" dirty="0" err="1">
                   <a:solidFill>
                     <a:schemeClr val="tx2"/>
                   </a:solidFill>
                 </a:rPr>
-                <a:t>RTOS Thread 2</a:t>
+                <a:t>Interrupt</a:t>
               </a:r>
-              <a:endParaRPr lang="en-GB" sz="1600" dirty="0">
-                <a:solidFill>
-                  <a:schemeClr val="tx2"/>
-                </a:solidFill>
-              </a:endParaRPr>
-            </a:p>
-          </p:txBody>
-        </p:sp>
-        <p:sp>
-          <p:nvSpPr>
-            <p:cNvPr id="8" name="Rectangle: Rounded Corners 7">
-              <a:extLst>
-                <a:ext uri="{FF2B5EF4-FFF2-40B4-BE49-F238E27FC236}">
-                  <a16:creationId xmlns:a16="http://schemas.microsoft.com/office/drawing/2014/main" id="{4ABD14D6-2C73-28D7-A08E-2F5DF64EFD06}"/>
-                </a:ext>
-              </a:extLst>
-            </p:cNvPr>
-            <p:cNvSpPr/>
-            <p:nvPr/>
-          </p:nvSpPr>
-          <p:spPr>
-            <a:xfrm>
-              <a:off x="10189542" y="2144807"/>
-              <a:ext cx="877498" cy="4414092"/>
-            </a:xfrm>
-            <a:prstGeom prst="roundRect">
-              <a:avLst/>
-            </a:prstGeom>
-            <a:solidFill>
-              <a:schemeClr val="bg1"/>
-            </a:solidFill>
-            <a:ln w="57150">
-              <a:solidFill>
-                <a:schemeClr val="tx2"/>
-              </a:solidFill>
-            </a:ln>
-          </p:spPr>
-          <p:style>
-            <a:lnRef idx="0">
-              <a:scrgbClr r="0" g="0" b="0"/>
-            </a:lnRef>
-            <a:fillRef idx="0">
-              <a:scrgbClr r="0" g="0" b="0"/>
-            </a:fillRef>
-            <a:effectRef idx="0">
-              <a:scrgbClr r="0" g="0" b="0"/>
-            </a:effectRef>
-            <a:fontRef idx="minor">
-              <a:schemeClr val="lt1"/>
-            </a:fontRef>
-          </p:style>
-          <p:txBody>
-            <a:bodyPr rtlCol="0" anchor="ctr"/>
-            <a:lstStyle/>
-            <a:p>
-              <a:pPr algn="ctr"/>
               <a:r>
                 <a:rPr lang="fr-FR" sz="1600" dirty="0">
                   <a:solidFill>
                     <a:schemeClr val="tx2"/>
                   </a:solidFill>
                 </a:rPr>
-                <a:t>RTOS Thread N</a:t>
+                <a:t> Handler</a:t>
               </a:r>
-              <a:endParaRPr lang="en-GB" sz="1600" dirty="0">
-                <a:solidFill>
-                  <a:schemeClr val="tx2"/>
+              <a:endParaRPr lang="en-GB" sz="1600" b="1" dirty="0">
+                <a:solidFill>
+                  <a:srgbClr val="FF0000"/>
                 </a:solidFill>
               </a:endParaRPr>
-            </a:p>
-          </p:txBody>
-        </p:sp>
-        <p:sp>
-          <p:nvSpPr>
-            <p:cNvPr id="10" name="TextBox 9">
-              <a:extLst>
-                <a:ext uri="{FF2B5EF4-FFF2-40B4-BE49-F238E27FC236}">
-                  <a16:creationId xmlns:a16="http://schemas.microsoft.com/office/drawing/2014/main" id="{395627A6-2D14-F0A8-C513-41CCF9CEB9FE}"/>
-                </a:ext>
-              </a:extLst>
-            </p:cNvPr>
-            <p:cNvSpPr txBox="1"/>
-            <p:nvPr/>
-          </p:nvSpPr>
-          <p:spPr>
-            <a:xfrm>
-              <a:off x="9773144" y="4356857"/>
-              <a:ext cx="404988" cy="307777"/>
-            </a:xfrm>
-            <a:prstGeom prst="rect">
-              <a:avLst/>
-            </a:prstGeom>
-            <a:noFill/>
-          </p:spPr>
-          <p:txBody>
-            <a:bodyPr wrap="square">
-              <a:spAutoFit/>
-            </a:bodyPr>
-            <a:lstStyle/>
-            <a:p>
-              <a:r>
-                <a:rPr lang="fr-FR" sz="1400" b="0" i="0" spc="0" dirty="0">
-                  <a:ln>
-                    <a:noFill/>
-                  </a:ln>
-                  <a:latin typeface="Source Sans Pro Light" charset="0"/>
-                  <a:ea typeface="Source Sans Pro Light" charset="0"/>
-                  <a:cs typeface="Source Sans Pro Light" charset="0"/>
-                </a:rPr>
-                <a:t>…</a:t>
-              </a:r>
-              <a:endParaRPr lang="en-US" sz="1400" dirty="0"/>
             </a:p>
           </p:txBody>
         </p:sp>
         <p:cxnSp>
           <p:nvCxnSpPr>
-            <p:cNvPr id="11" name="Connecteur droit avec flèche 16">
+            <p:cNvPr id="12" name="Connector: Curved 11">
               <a:extLst>
                 <a:ext uri="{FF2B5EF4-FFF2-40B4-BE49-F238E27FC236}">
-                  <a16:creationId xmlns:a16="http://schemas.microsoft.com/office/drawing/2014/main" id="{1385CF0A-A889-96E8-0B5E-903F1231B959}"/>
+                  <a16:creationId xmlns:a16="http://schemas.microsoft.com/office/drawing/2014/main" id="{4C6660D2-880E-3017-4BBC-CB1ED825EFA6}"/>
                 </a:ext>
               </a:extLst>
             </p:cNvPr>
             <p:cNvCxnSpPr>
               <a:cxnSpLocks/>
+              <a:stCxn id="6" idx="1"/>
             </p:cNvCxnSpPr>
             <p:nvPr/>
           </p:nvCxnSpPr>
           <p:spPr>
-            <a:xfrm flipH="1">
-              <a:off x="8222876" y="5001797"/>
-              <a:ext cx="786493" cy="0"/>
+            <a:xfrm rot="10800000">
+              <a:off x="7820626" y="3915607"/>
+              <a:ext cx="1073549" cy="1735066"/>
             </a:xfrm>
-            <a:prstGeom prst="straightConnector1">
+            <a:prstGeom prst="curvedConnector2">
               <a:avLst/>
             </a:prstGeom>
             <a:ln>
@@ -17779,6 +17914,125 @@
             </a:fontRef>
           </p:style>
         </p:cxnSp>
+        <p:sp>
+          <p:nvSpPr>
+            <p:cNvPr id="18" name="ZoneTexte 45">
+              <a:extLst>
+                <a:ext uri="{FF2B5EF4-FFF2-40B4-BE49-F238E27FC236}">
+                  <a16:creationId xmlns:a16="http://schemas.microsoft.com/office/drawing/2014/main" id="{8E701738-43F9-F477-C8F7-32DB8311B8A5}"/>
+                </a:ext>
+              </a:extLst>
+            </p:cNvPr>
+            <p:cNvSpPr txBox="1"/>
+            <p:nvPr/>
+          </p:nvSpPr>
+          <p:spPr>
+            <a:xfrm>
+              <a:off x="7903545" y="4034674"/>
+              <a:ext cx="440030" cy="215444"/>
+            </a:xfrm>
+            <a:prstGeom prst="rect">
+              <a:avLst/>
+            </a:prstGeom>
+            <a:noFill/>
+          </p:spPr>
+          <p:txBody>
+            <a:bodyPr vert="horz" wrap="square" lIns="0" tIns="0" rIns="0" bIns="0" numCol="1" spcCol="288000" rtlCol="0" anchor="t" anchorCtr="0">
+              <a:spAutoFit/>
+            </a:bodyPr>
+            <a:lstStyle/>
+            <a:p>
+              <a:pPr algn="l">
+                <a:spcBef>
+                  <a:spcPts val="0"/>
+                </a:spcBef>
+                <a:spcAft>
+                  <a:spcPts val="600"/>
+                </a:spcAft>
+              </a:pPr>
+              <a:r>
+                <a:rPr lang="en-US" sz="1400" dirty="0">
+                  <a:solidFill>
+                    <a:schemeClr val="tx2"/>
+                  </a:solidFill>
+                  <a:latin typeface="Source Sans Pro Light" charset="0"/>
+                  <a:ea typeface="Source Sans Pro Light" charset="0"/>
+                  <a:cs typeface="Source Sans Pro Light" charset="0"/>
+                </a:rPr>
+                <a:t>PUSH</a:t>
+              </a:r>
+              <a:endParaRPr lang="en-US" sz="1400" b="0" i="0" spc="0" dirty="0">
+                <a:ln>
+                  <a:noFill/>
+                </a:ln>
+                <a:solidFill>
+                  <a:schemeClr val="tx2"/>
+                </a:solidFill>
+                <a:latin typeface="Source Sans Pro Light" charset="0"/>
+                <a:ea typeface="Source Sans Pro Light" charset="0"/>
+                <a:cs typeface="Source Sans Pro Light" charset="0"/>
+              </a:endParaRPr>
+            </a:p>
+          </p:txBody>
+        </p:sp>
+        <p:sp>
+          <p:nvSpPr>
+            <p:cNvPr id="33" name="TextBox 32">
+              <a:extLst>
+                <a:ext uri="{FF2B5EF4-FFF2-40B4-BE49-F238E27FC236}">
+                  <a16:creationId xmlns:a16="http://schemas.microsoft.com/office/drawing/2014/main" id="{871D8234-EE72-7E8B-388D-E4701EE6FF52}"/>
+                </a:ext>
+              </a:extLst>
+            </p:cNvPr>
+            <p:cNvSpPr txBox="1"/>
+            <p:nvPr/>
+          </p:nvSpPr>
+          <p:spPr>
+            <a:xfrm>
+              <a:off x="10707660" y="5457564"/>
+              <a:ext cx="125034" cy="307777"/>
+            </a:xfrm>
+            <a:prstGeom prst="rect">
+              <a:avLst/>
+            </a:prstGeom>
+            <a:noFill/>
+          </p:spPr>
+          <p:txBody>
+            <a:bodyPr vert="horz" wrap="none" lIns="0" tIns="0" rIns="0" bIns="0" numCol="1" spcCol="288000" rtlCol="0" anchor="t" anchorCtr="0">
+              <a:spAutoFit/>
+            </a:bodyPr>
+            <a:lstStyle/>
+            <a:p>
+              <a:pPr algn="l">
+                <a:spcBef>
+                  <a:spcPts val="0"/>
+                </a:spcBef>
+                <a:spcAft>
+                  <a:spcPts val="600"/>
+                </a:spcAft>
+              </a:pPr>
+              <a:r>
+                <a:rPr lang="fr-FR" sz="2000" b="1" dirty="0">
+                  <a:solidFill>
+                    <a:srgbClr val="FF0000"/>
+                  </a:solidFill>
+                </a:rPr>
+                <a:t>*</a:t>
+              </a:r>
+              <a:endParaRPr lang="en-US" sz="2000" b="0" i="0" spc="0" dirty="0">
+                <a:ln>
+                  <a:noFill/>
+                </a:ln>
+                <a:solidFill>
+                  <a:schemeClr val="tx2"/>
+                </a:solidFill>
+                <a:latin typeface="Source Sans Pro Light" charset="0"/>
+                <a:ea typeface="Source Sans Pro Light" charset="0"/>
+                <a:cs typeface="Source Sans Pro Light" charset="0"/>
+              </a:endParaRPr>
+            </a:p>
+          </p:txBody>
+        </p:sp>
       </p:grpSp>
     </p:spTree>
     <p:extLst>

</xml_diff>